<commit_message>
amendments in final project presentation
</commit_message>
<xml_diff>
--- a/deloitte_investment_project/outputs/Deloitte_Investment_Project_JohnHios.pptx
+++ b/deloitte_investment_project/outputs/Deloitte_Investment_Project_JohnHios.pptx
@@ -11,11 +11,13 @@
     <p:sldId id="308" r:id="rId8"/>
     <p:sldId id="309" r:id="rId9"/>
     <p:sldId id="313" r:id="rId10"/>
-    <p:sldId id="316" r:id="rId11"/>
-    <p:sldId id="317" r:id="rId12"/>
-    <p:sldId id="318" r:id="rId13"/>
-    <p:sldId id="310" r:id="rId14"/>
-    <p:sldId id="311" r:id="rId15"/>
+    <p:sldId id="321" r:id="rId11"/>
+    <p:sldId id="316" r:id="rId12"/>
+    <p:sldId id="317" r:id="rId13"/>
+    <p:sldId id="318" r:id="rId14"/>
+    <p:sldId id="310" r:id="rId15"/>
+    <p:sldId id="322" r:id="rId16"/>
+    <p:sldId id="311" r:id="rId17"/>
   </p:sldIdLst>
   <p:sldSz cx="12192000" cy="6858000"/>
   <p:notesSz cx="6858000" cy="9144000"/>
@@ -366,7 +368,7 @@
           <a:p>
             <a:fld id="{9184DA70-C731-4C70-880D-CCD4705E623C}" type="datetime1">
               <a:rPr lang="en-US" smtClean="0"/>
-              <a:t>6/8/2022</a:t>
+              <a:t>6/9/2022</a:t>
             </a:fld>
             <a:endParaRPr lang="en-US" dirty="0"/>
           </a:p>
@@ -554,7 +556,7 @@
           <a:p>
             <a:fld id="{4BE1D723-8F53-4F53-90B0-1982A396982E}" type="datetime1">
               <a:rPr lang="en-US" smtClean="0"/>
-              <a:t>6/8/2022</a:t>
+              <a:t>6/9/2022</a:t>
             </a:fld>
             <a:endParaRPr lang="en-US" dirty="0"/>
           </a:p>
@@ -927,7 +929,7 @@
           <a:p>
             <a:fld id="{97669AF7-7BEB-44E4-9852-375E34362B5B}" type="datetime1">
               <a:rPr lang="en-US" smtClean="0"/>
-              <a:t>6/8/2022</a:t>
+              <a:t>6/9/2022</a:t>
             </a:fld>
             <a:endParaRPr lang="en-US" dirty="0"/>
           </a:p>
@@ -1182,7 +1184,7 @@
           <a:p>
             <a:fld id="{BAAAC38D-0552-4C82-B593-E6124DFADBE2}" type="datetime1">
               <a:rPr lang="en-US" smtClean="0"/>
-              <a:t>6/8/2022</a:t>
+              <a:t>6/9/2022</a:t>
             </a:fld>
             <a:endParaRPr lang="en-US" dirty="0"/>
           </a:p>
@@ -1579,7 +1581,7 @@
           <a:p>
             <a:fld id="{D9DF0F1C-5577-4ACB-BB62-DF8F3C494C7E}" type="datetime1">
               <a:rPr lang="en-US" smtClean="0"/>
-              <a:t>6/8/2022</a:t>
+              <a:t>6/9/2022</a:t>
             </a:fld>
             <a:endParaRPr lang="en-US" dirty="0"/>
           </a:p>
@@ -1715,7 +1717,7 @@
           <a:p>
             <a:fld id="{1775B394-D9F9-4F0C-B15D-605F45CB9E9F}" type="datetime1">
               <a:rPr lang="en-US" smtClean="0"/>
-              <a:t>6/8/2022</a:t>
+              <a:t>6/9/2022</a:t>
             </a:fld>
             <a:endParaRPr lang="en-US" dirty="0"/>
           </a:p>
@@ -1872,7 +1874,7 @@
           <a:p>
             <a:fld id="{39667345-2558-425A-8533-9BFDBCE15005}" type="datetime1">
               <a:rPr lang="en-US" smtClean="0"/>
-              <a:t>6/8/2022</a:t>
+              <a:t>6/9/2022</a:t>
             </a:fld>
             <a:endParaRPr lang="en-US" dirty="0"/>
           </a:p>
@@ -2201,7 +2203,7 @@
           <a:p>
             <a:fld id="{92BEA474-078D-4E9B-9B14-09A87B19DC46}" type="datetime1">
               <a:rPr lang="en-US" smtClean="0"/>
-              <a:t>6/8/2022</a:t>
+              <a:t>6/9/2022</a:t>
             </a:fld>
             <a:endParaRPr lang="en-US" dirty="0"/>
           </a:p>
@@ -2551,7 +2553,7 @@
           <a:p>
             <a:fld id="{4907D986-8816-4272-A432-0437A28A9828}" type="datetime1">
               <a:rPr lang="en-US" smtClean="0"/>
-              <a:t>6/8/2022</a:t>
+              <a:t>6/9/2022</a:t>
             </a:fld>
             <a:endParaRPr lang="en-US" dirty="0"/>
           </a:p>
@@ -2812,7 +2814,7 @@
           <a:p>
             <a:fld id="{62D6E202-B606-4609-B914-27C9371A1F6D}" type="datetime1">
               <a:rPr lang="en-US" smtClean="0"/>
-              <a:t>6/8/2022</a:t>
+              <a:t>6/9/2022</a:t>
             </a:fld>
             <a:endParaRPr lang="en-US" dirty="0"/>
           </a:p>
@@ -3591,12 +3593,12 @@
           <a:lstStyle/>
           <a:p>
             <a:r>
-              <a:rPr lang="en-US" sz="4400" dirty="0">
+              <a:rPr lang="en-US" sz="3600" dirty="0">
                 <a:solidFill>
                   <a:schemeClr val="tx1"/>
                 </a:solidFill>
               </a:rPr>
-              <a:t>Deloitte: Investment Project</a:t>
+              <a:t>Productivity &amp; Investment in the UK</a:t>
             </a:r>
           </a:p>
         </p:txBody>
@@ -3796,6 +3798,622 @@
           <p:cNvPr id="2" name="Title 1">
             <a:extLst>
               <a:ext uri="{FF2B5EF4-FFF2-40B4-BE49-F238E27FC236}">
+                <a16:creationId xmlns:a16="http://schemas.microsoft.com/office/drawing/2014/main" id="{80EFE8AC-1E6F-C1D3-E1AF-D65EF9149E1B}"/>
+              </a:ext>
+            </a:extLst>
+          </p:cNvPr>
+          <p:cNvSpPr>
+            <a:spLocks noGrp="1"/>
+          </p:cNvSpPr>
+          <p:nvPr>
+            <p:ph type="title"/>
+          </p:nvPr>
+        </p:nvSpPr>
+        <p:spPr/>
+        <p:txBody>
+          <a:bodyPr/>
+          <a:lstStyle/>
+          <a:p>
+            <a:r>
+              <a:rPr lang="en-GB" dirty="0"/>
+              <a:t>Prediction of Productivity Based on Investment (cont’d)</a:t>
+            </a:r>
+          </a:p>
+        </p:txBody>
+      </p:sp>
+      <p:sp>
+        <p:nvSpPr>
+          <p:cNvPr id="4" name="TextBox 3">
+            <a:extLst>
+              <a:ext uri="{FF2B5EF4-FFF2-40B4-BE49-F238E27FC236}">
+                <a16:creationId xmlns:a16="http://schemas.microsoft.com/office/drawing/2014/main" id="{75E2D7CD-DE6E-CDFA-491E-AA0FF9688048}"/>
+              </a:ext>
+            </a:extLst>
+          </p:cNvPr>
+          <p:cNvSpPr txBox="1"/>
+          <p:nvPr/>
+        </p:nvSpPr>
+        <p:spPr>
+          <a:xfrm>
+            <a:off x="1097280" y="2392253"/>
+            <a:ext cx="8985013" cy="276999"/>
+          </a:xfrm>
+          <a:prstGeom prst="rect">
+            <a:avLst/>
+          </a:prstGeom>
+          <a:noFill/>
+        </p:spPr>
+        <p:txBody>
+          <a:bodyPr wrap="square" lIns="0" tIns="0" rIns="0" bIns="0" rtlCol="0">
+            <a:spAutoFit/>
+          </a:bodyPr>
+          <a:lstStyle/>
+          <a:p>
+            <a:endParaRPr lang="en-GB" dirty="0"/>
+          </a:p>
+        </p:txBody>
+      </p:sp>
+      <p:graphicFrame>
+        <p:nvGraphicFramePr>
+          <p:cNvPr id="6" name="Table 8">
+            <a:extLst>
+              <a:ext uri="{FF2B5EF4-FFF2-40B4-BE49-F238E27FC236}">
+                <a16:creationId xmlns:a16="http://schemas.microsoft.com/office/drawing/2014/main" id="{6AF3C782-4C22-E29B-70F2-8628002C99FD}"/>
+              </a:ext>
+            </a:extLst>
+          </p:cNvPr>
+          <p:cNvGraphicFramePr>
+            <a:graphicFrameLocks noGrp="1"/>
+          </p:cNvGraphicFramePr>
+          <p:nvPr>
+            <p:extLst>
+              <p:ext uri="{D42A27DB-BD31-4B8C-83A1-F6EECF244321}">
+                <p14:modId xmlns:p14="http://schemas.microsoft.com/office/powerpoint/2010/main" val="3731706070"/>
+              </p:ext>
+            </p:extLst>
+          </p:nvPr>
+        </p:nvGraphicFramePr>
+        <p:xfrm>
+          <a:off x="1671499" y="2207549"/>
+          <a:ext cx="9157059" cy="1981200"/>
+        </p:xfrm>
+        <a:graphic>
+          <a:graphicData uri="http://schemas.openxmlformats.org/drawingml/2006/table">
+            <a:tbl>
+              <a:tblPr firstRow="1" bandRow="1">
+                <a:tableStyleId>{5C22544A-7EE6-4342-B048-85BDC9FD1C3A}</a:tableStyleId>
+              </a:tblPr>
+              <a:tblGrid>
+                <a:gridCol w="6581500">
+                  <a:extLst>
+                    <a:ext uri="{9D8B030D-6E8A-4147-A177-3AD203B41FA5}">
+                      <a16:colId xmlns:a16="http://schemas.microsoft.com/office/drawing/2014/main" val="2429990377"/>
+                    </a:ext>
+                  </a:extLst>
+                </a:gridCol>
+                <a:gridCol w="2575559">
+                  <a:extLst>
+                    <a:ext uri="{9D8B030D-6E8A-4147-A177-3AD203B41FA5}">
+                      <a16:colId xmlns:a16="http://schemas.microsoft.com/office/drawing/2014/main" val="3734979491"/>
+                    </a:ext>
+                  </a:extLst>
+                </a:gridCol>
+              </a:tblGrid>
+              <a:tr h="521357">
+                <a:tc rowSpan="5">
+                  <a:txBody>
+                    <a:bodyPr/>
+                    <a:lstStyle/>
+                    <a:p>
+                      <a:r>
+                        <a:rPr lang="en-GB" sz="1800" dirty="0"/>
+                        <a:t>Linear Regression model</a:t>
+                      </a:r>
+                    </a:p>
+                    <a:p>
+                      <a:endParaRPr lang="en-GB" sz="1400" dirty="0"/>
+                    </a:p>
+                  </a:txBody>
+                  <a:tcPr/>
+                </a:tc>
+                <a:tc>
+                  <a:txBody>
+                    <a:bodyPr/>
+                    <a:lstStyle/>
+                    <a:p>
+                      <a:r>
+                        <a:rPr lang="en-GB" sz="1800" dirty="0"/>
+                        <a:t>Variance explained (%)</a:t>
+                      </a:r>
+                    </a:p>
+                    <a:p>
+                      <a:endParaRPr lang="en-GB" sz="1800" dirty="0"/>
+                    </a:p>
+                  </a:txBody>
+                  <a:tcPr/>
+                </a:tc>
+                <a:extLst>
+                  <a:ext uri="{0D108BD9-81ED-4DB2-BD59-A6C34878D82A}">
+                    <a16:rowId xmlns:a16="http://schemas.microsoft.com/office/drawing/2014/main" val="368584855"/>
+                  </a:ext>
+                </a:extLst>
+              </a:tr>
+              <a:tr h="312814">
+                <a:tc vMerge="1">
+                  <a:txBody>
+                    <a:bodyPr/>
+                    <a:lstStyle/>
+                    <a:p>
+                      <a:endParaRPr lang="en-GB" sz="1200" dirty="0"/>
+                    </a:p>
+                  </a:txBody>
+                  <a:tcPr/>
+                </a:tc>
+                <a:tc>
+                  <a:txBody>
+                    <a:bodyPr/>
+                    <a:lstStyle/>
+                    <a:p>
+                      <a:r>
+                        <a:rPr lang="en-GB" sz="1600" dirty="0"/>
+                        <a:t>32.85</a:t>
+                      </a:r>
+                    </a:p>
+                  </a:txBody>
+                  <a:tcPr/>
+                </a:tc>
+                <a:extLst>
+                  <a:ext uri="{0D108BD9-81ED-4DB2-BD59-A6C34878D82A}">
+                    <a16:rowId xmlns:a16="http://schemas.microsoft.com/office/drawing/2014/main" val="3141812195"/>
+                  </a:ext>
+                </a:extLst>
+              </a:tr>
+              <a:tr h="312814">
+                <a:tc vMerge="1">
+                  <a:txBody>
+                    <a:bodyPr/>
+                    <a:lstStyle/>
+                    <a:p>
+                      <a:endParaRPr lang="en-GB" sz="1200" dirty="0"/>
+                    </a:p>
+                  </a:txBody>
+                  <a:tcPr/>
+                </a:tc>
+                <a:tc>
+                  <a:txBody>
+                    <a:bodyPr/>
+                    <a:lstStyle/>
+                    <a:p>
+                      <a:r>
+                        <a:rPr lang="en-GB" sz="1600" dirty="0"/>
+                        <a:t>17.27</a:t>
+                      </a:r>
+                    </a:p>
+                  </a:txBody>
+                  <a:tcPr/>
+                </a:tc>
+                <a:extLst>
+                  <a:ext uri="{0D108BD9-81ED-4DB2-BD59-A6C34878D82A}">
+                    <a16:rowId xmlns:a16="http://schemas.microsoft.com/office/drawing/2014/main" val="4155198396"/>
+                  </a:ext>
+                </a:extLst>
+              </a:tr>
+              <a:tr h="312814">
+                <a:tc vMerge="1">
+                  <a:txBody>
+                    <a:bodyPr/>
+                    <a:lstStyle/>
+                    <a:p>
+                      <a:endParaRPr lang="en-GB" sz="1200" dirty="0"/>
+                    </a:p>
+                  </a:txBody>
+                  <a:tcPr/>
+                </a:tc>
+                <a:tc>
+                  <a:txBody>
+                    <a:bodyPr/>
+                    <a:lstStyle/>
+                    <a:p>
+                      <a:r>
+                        <a:rPr lang="en-GB" sz="1600" dirty="0"/>
+                        <a:t>34.42</a:t>
+                      </a:r>
+                    </a:p>
+                  </a:txBody>
+                  <a:tcPr/>
+                </a:tc>
+                <a:extLst>
+                  <a:ext uri="{0D108BD9-81ED-4DB2-BD59-A6C34878D82A}">
+                    <a16:rowId xmlns:a16="http://schemas.microsoft.com/office/drawing/2014/main" val="2103473534"/>
+                  </a:ext>
+                </a:extLst>
+              </a:tr>
+              <a:tr h="312814">
+                <a:tc vMerge="1">
+                  <a:txBody>
+                    <a:bodyPr/>
+                    <a:lstStyle/>
+                    <a:p>
+                      <a:endParaRPr lang="en-GB" sz="1200" dirty="0"/>
+                    </a:p>
+                  </a:txBody>
+                  <a:tcPr/>
+                </a:tc>
+                <a:tc>
+                  <a:txBody>
+                    <a:bodyPr/>
+                    <a:lstStyle/>
+                    <a:p>
+                      <a:r>
+                        <a:rPr lang="en-GB" sz="1600" dirty="0"/>
+                        <a:t>15.01</a:t>
+                      </a:r>
+                    </a:p>
+                  </a:txBody>
+                  <a:tcPr/>
+                </a:tc>
+                <a:extLst>
+                  <a:ext uri="{0D108BD9-81ED-4DB2-BD59-A6C34878D82A}">
+                    <a16:rowId xmlns:a16="http://schemas.microsoft.com/office/drawing/2014/main" val="402570956"/>
+                  </a:ext>
+                </a:extLst>
+              </a:tr>
+            </a:tbl>
+          </a:graphicData>
+        </a:graphic>
+      </p:graphicFrame>
+      <p:graphicFrame>
+        <p:nvGraphicFramePr>
+          <p:cNvPr id="9" name="Table 9">
+            <a:extLst>
+              <a:ext uri="{FF2B5EF4-FFF2-40B4-BE49-F238E27FC236}">
+                <a16:creationId xmlns:a16="http://schemas.microsoft.com/office/drawing/2014/main" id="{AD32E437-1D04-1125-C362-E306B2E9EA56}"/>
+              </a:ext>
+            </a:extLst>
+          </p:cNvPr>
+          <p:cNvGraphicFramePr>
+            <a:graphicFrameLocks noGrp="1"/>
+          </p:cNvGraphicFramePr>
+          <p:nvPr>
+            <p:extLst>
+              <p:ext uri="{D42A27DB-BD31-4B8C-83A1-F6EECF244321}">
+                <p14:modId xmlns:p14="http://schemas.microsoft.com/office/powerpoint/2010/main" val="2330059312"/>
+              </p:ext>
+            </p:extLst>
+          </p:nvPr>
+        </p:nvGraphicFramePr>
+        <p:xfrm>
+          <a:off x="4680309" y="5322491"/>
+          <a:ext cx="2277374" cy="736600"/>
+        </p:xfrm>
+        <a:graphic>
+          <a:graphicData uri="http://schemas.openxmlformats.org/drawingml/2006/table">
+            <a:tbl>
+              <a:tblPr firstRow="1" bandRow="1">
+                <a:tableStyleId>{5C22544A-7EE6-4342-B048-85BDC9FD1C3A}</a:tableStyleId>
+              </a:tblPr>
+              <a:tblGrid>
+                <a:gridCol w="1138687">
+                  <a:extLst>
+                    <a:ext uri="{9D8B030D-6E8A-4147-A177-3AD203B41FA5}">
+                      <a16:colId xmlns:a16="http://schemas.microsoft.com/office/drawing/2014/main" val="644099366"/>
+                    </a:ext>
+                  </a:extLst>
+                </a:gridCol>
+                <a:gridCol w="1138687">
+                  <a:extLst>
+                    <a:ext uri="{9D8B030D-6E8A-4147-A177-3AD203B41FA5}">
+                      <a16:colId xmlns:a16="http://schemas.microsoft.com/office/drawing/2014/main" val="2001716684"/>
+                    </a:ext>
+                  </a:extLst>
+                </a:gridCol>
+              </a:tblGrid>
+              <a:tr h="236490">
+                <a:tc>
+                  <a:txBody>
+                    <a:bodyPr/>
+                    <a:lstStyle/>
+                    <a:p>
+                      <a:r>
+                        <a:rPr lang="en-GB" dirty="0"/>
+                        <a:t>RMSE</a:t>
+                      </a:r>
+                    </a:p>
+                  </a:txBody>
+                  <a:tcPr/>
+                </a:tc>
+                <a:tc>
+                  <a:txBody>
+                    <a:bodyPr/>
+                    <a:lstStyle/>
+                    <a:p>
+                      <a:r>
+                        <a:rPr lang="en-GB" dirty="0"/>
+                        <a:t>R</a:t>
+                      </a:r>
+                      <a:r>
+                        <a:rPr lang="en-GB" baseline="30000" dirty="0"/>
+                        <a:t>2</a:t>
+                      </a:r>
+                    </a:p>
+                  </a:txBody>
+                  <a:tcPr/>
+                </a:tc>
+                <a:extLst>
+                  <a:ext uri="{0D108BD9-81ED-4DB2-BD59-A6C34878D82A}">
+                    <a16:rowId xmlns:a16="http://schemas.microsoft.com/office/drawing/2014/main" val="3640030188"/>
+                  </a:ext>
+                </a:extLst>
+              </a:tr>
+              <a:tr h="370840">
+                <a:tc>
+                  <a:txBody>
+                    <a:bodyPr/>
+                    <a:lstStyle/>
+                    <a:p>
+                      <a:r>
+                        <a:rPr lang="en-GB" dirty="0"/>
+                        <a:t>0.617</a:t>
+                      </a:r>
+                    </a:p>
+                  </a:txBody>
+                  <a:tcPr/>
+                </a:tc>
+                <a:tc>
+                  <a:txBody>
+                    <a:bodyPr/>
+                    <a:lstStyle/>
+                    <a:p>
+                      <a:r>
+                        <a:rPr lang="en-GB" dirty="0"/>
+                        <a:t>0.968</a:t>
+                      </a:r>
+                    </a:p>
+                  </a:txBody>
+                  <a:tcPr/>
+                </a:tc>
+                <a:extLst>
+                  <a:ext uri="{0D108BD9-81ED-4DB2-BD59-A6C34878D82A}">
+                    <a16:rowId xmlns:a16="http://schemas.microsoft.com/office/drawing/2014/main" val="1128371097"/>
+                  </a:ext>
+                </a:extLst>
+              </a:tr>
+            </a:tbl>
+          </a:graphicData>
+        </a:graphic>
+      </p:graphicFrame>
+      <p:sp>
+        <p:nvSpPr>
+          <p:cNvPr id="8" name="TextBox 7">
+            <a:extLst>
+              <a:ext uri="{FF2B5EF4-FFF2-40B4-BE49-F238E27FC236}">
+                <a16:creationId xmlns:a16="http://schemas.microsoft.com/office/drawing/2014/main" id="{FA1BBC8A-38BA-9276-395B-243809267300}"/>
+              </a:ext>
+            </a:extLst>
+          </p:cNvPr>
+          <p:cNvSpPr txBox="1"/>
+          <p:nvPr/>
+        </p:nvSpPr>
+        <p:spPr>
+          <a:xfrm>
+            <a:off x="1818999" y="2508804"/>
+            <a:ext cx="7886700" cy="1668149"/>
+          </a:xfrm>
+          <a:prstGeom prst="rect">
+            <a:avLst/>
+          </a:prstGeom>
+          <a:noFill/>
+        </p:spPr>
+        <p:txBody>
+          <a:bodyPr wrap="square">
+            <a:spAutoFit/>
+          </a:bodyPr>
+          <a:lstStyle/>
+          <a:p>
+            <a:pPr>
+              <a:lnSpc>
+                <a:spcPct val="150000"/>
+              </a:lnSpc>
+            </a:pPr>
+            <a:r>
+              <a:rPr lang="en-GB" sz="1400" dirty="0">
+                <a:solidFill>
+                  <a:schemeClr val="bg1"/>
+                </a:solidFill>
+              </a:rPr>
+              <a:t>(GDP per hour worked $) = 26.96 </a:t>
+            </a:r>
+          </a:p>
+          <a:p>
+            <a:pPr>
+              <a:lnSpc>
+                <a:spcPct val="150000"/>
+              </a:lnSpc>
+            </a:pPr>
+            <a:r>
+              <a:rPr lang="en-GB" sz="1400" dirty="0">
+                <a:solidFill>
+                  <a:schemeClr val="bg1"/>
+                </a:solidFill>
+              </a:rPr>
+              <a:t>		+ 0.1682</a:t>
+            </a:r>
+            <a:r>
+              <a:rPr lang="en-GB" sz="1400" baseline="-25000" dirty="0">
+                <a:solidFill>
+                  <a:schemeClr val="bg1"/>
+                </a:solidFill>
+              </a:rPr>
+              <a:t> </a:t>
+            </a:r>
+            <a:r>
+              <a:rPr lang="en-GB" sz="1400" dirty="0">
+                <a:solidFill>
+                  <a:schemeClr val="bg1"/>
+                </a:solidFill>
+                <a:sym typeface="Symbol" panose="05050102010706020507" pitchFamily="18" charset="2"/>
+              </a:rPr>
+              <a:t> </a:t>
+            </a:r>
+            <a:r>
+              <a:rPr lang="en-GB" sz="1400" dirty="0">
+                <a:solidFill>
+                  <a:schemeClr val="bg1"/>
+                </a:solidFill>
+              </a:rPr>
+              <a:t>(Infrastructures $billion)</a:t>
+            </a:r>
+          </a:p>
+          <a:p>
+            <a:pPr>
+              <a:lnSpc>
+                <a:spcPct val="150000"/>
+              </a:lnSpc>
+            </a:pPr>
+            <a:r>
+              <a:rPr lang="en-GB" sz="1400" dirty="0">
+                <a:solidFill>
+                  <a:schemeClr val="bg1"/>
+                </a:solidFill>
+              </a:rPr>
+              <a:t>		+ 0.1717</a:t>
+            </a:r>
+            <a:r>
+              <a:rPr lang="en-GB" sz="1400" dirty="0">
+                <a:solidFill>
+                  <a:schemeClr val="bg1"/>
+                </a:solidFill>
+                <a:sym typeface="Symbol" panose="05050102010706020507" pitchFamily="18" charset="2"/>
+              </a:rPr>
+              <a:t>  </a:t>
+            </a:r>
+            <a:r>
+              <a:rPr lang="en-GB" sz="1400" dirty="0">
+                <a:solidFill>
+                  <a:schemeClr val="bg1"/>
+                </a:solidFill>
+              </a:rPr>
+              <a:t>(Intellectual Property $billion)  </a:t>
+            </a:r>
+          </a:p>
+          <a:p>
+            <a:pPr>
+              <a:lnSpc>
+                <a:spcPct val="150000"/>
+              </a:lnSpc>
+            </a:pPr>
+            <a:r>
+              <a:rPr lang="en-GB" sz="1400" dirty="0">
+                <a:solidFill>
+                  <a:schemeClr val="bg1"/>
+                </a:solidFill>
+              </a:rPr>
+              <a:t>		+ 0.2123</a:t>
+            </a:r>
+            <a:r>
+              <a:rPr lang="en-GB" sz="1400" dirty="0">
+                <a:solidFill>
+                  <a:schemeClr val="bg1"/>
+                </a:solidFill>
+                <a:sym typeface="Symbol" panose="05050102010706020507" pitchFamily="18" charset="2"/>
+              </a:rPr>
+              <a:t>  </a:t>
+            </a:r>
+            <a:r>
+              <a:rPr lang="en-GB" sz="1400" dirty="0">
+                <a:solidFill>
+                  <a:schemeClr val="bg1"/>
+                </a:solidFill>
+              </a:rPr>
+              <a:t>(Dwellings $billion)</a:t>
+            </a:r>
+          </a:p>
+          <a:p>
+            <a:pPr>
+              <a:lnSpc>
+                <a:spcPct val="150000"/>
+              </a:lnSpc>
+            </a:pPr>
+            <a:r>
+              <a:rPr lang="en-GB" sz="1400" dirty="0">
+                <a:solidFill>
+                  <a:schemeClr val="bg1"/>
+                </a:solidFill>
+              </a:rPr>
+              <a:t>		-  0.001436</a:t>
+            </a:r>
+            <a:r>
+              <a:rPr lang="en-GB" sz="1400" dirty="0">
+                <a:solidFill>
+                  <a:schemeClr val="bg1"/>
+                </a:solidFill>
+                <a:sym typeface="Symbol" panose="05050102010706020507" pitchFamily="18" charset="2"/>
+              </a:rPr>
+              <a:t>  </a:t>
+            </a:r>
+            <a:r>
+              <a:rPr lang="en-GB" sz="1400" dirty="0">
+                <a:solidFill>
+                  <a:schemeClr val="bg1"/>
+                </a:solidFill>
+              </a:rPr>
+              <a:t>(Infrastructures $billion</a:t>
+            </a:r>
+            <a:r>
+              <a:rPr lang="en-GB" sz="1400" dirty="0">
+                <a:solidFill>
+                  <a:schemeClr val="bg1"/>
+                </a:solidFill>
+                <a:sym typeface="Symbol" panose="05050102010706020507" pitchFamily="18" charset="2"/>
+              </a:rPr>
+              <a:t>  </a:t>
+            </a:r>
+            <a:r>
+              <a:rPr lang="en-GB" sz="1400" dirty="0">
+                <a:solidFill>
+                  <a:schemeClr val="bg1"/>
+                </a:solidFill>
+              </a:rPr>
+              <a:t>Dwellings $billion)</a:t>
+            </a:r>
+          </a:p>
+        </p:txBody>
+      </p:sp>
+    </p:spTree>
+    <p:extLst>
+      <p:ext uri="{BB962C8B-B14F-4D97-AF65-F5344CB8AC3E}">
+        <p14:creationId xmlns:p14="http://schemas.microsoft.com/office/powerpoint/2010/main" val="234136719"/>
+      </p:ext>
+    </p:extLst>
+  </p:cSld>
+  <p:clrMapOvr>
+    <a:masterClrMapping/>
+  </p:clrMapOvr>
+</p:sld>
+</file>
+
+<file path=ppt/slides/slide11.xml><?xml version="1.0" encoding="utf-8"?>
+<p:sld xmlns:a="http://schemas.openxmlformats.org/drawingml/2006/main" xmlns:r="http://schemas.openxmlformats.org/officeDocument/2006/relationships" xmlns:p="http://schemas.openxmlformats.org/presentationml/2006/main">
+  <p:cSld>
+    <p:spTree>
+      <p:nvGrpSpPr>
+        <p:cNvPr id="1" name=""/>
+        <p:cNvGrpSpPr/>
+        <p:nvPr/>
+      </p:nvGrpSpPr>
+      <p:grpSpPr>
+        <a:xfrm>
+          <a:off x="0" y="0"/>
+          <a:ext cx="0" cy="0"/>
+          <a:chOff x="0" y="0"/>
+          <a:chExt cx="0" cy="0"/>
+        </a:xfrm>
+      </p:grpSpPr>
+      <p:sp>
+        <p:nvSpPr>
+          <p:cNvPr id="2" name="Title 1">
+            <a:extLst>
+              <a:ext uri="{FF2B5EF4-FFF2-40B4-BE49-F238E27FC236}">
                 <a16:creationId xmlns:a16="http://schemas.microsoft.com/office/drawing/2014/main" id="{A61F09B2-9332-DFE8-F39B-CC925D5AB69A}"/>
               </a:ext>
             </a:extLst>
@@ -3843,7 +4461,7 @@
         <p:spPr/>
         <p:txBody>
           <a:bodyPr>
-            <a:normAutofit fontScale="77500" lnSpcReduction="20000"/>
+            <a:normAutofit fontScale="92500" lnSpcReduction="20000"/>
           </a:bodyPr>
           <a:lstStyle/>
           <a:p>
@@ -3863,7 +4481,7 @@
             </a:pPr>
             <a:r>
               <a:rPr lang="en-GB" dirty="0"/>
-              <a:t> Compared to France and Germany (countries similar in size of population and economy) productivity is notably lower in key industrial sectors</a:t>
+              <a:t> Compared to France and Germany (countries similar in size of population and economy) productivity is notably lower in key economic activities</a:t>
             </a:r>
           </a:p>
           <a:p>
@@ -3873,7 +4491,7 @@
             </a:pPr>
             <a:r>
               <a:rPr lang="en-GB" dirty="0"/>
-              <a:t> Infrastructure and Dwelling investments seem to have the largest impact in the UK GDP per hour worked</a:t>
+              <a:t> Infrastructure and Dwelling investments seem to have the largest impact in the UK GDP per hour worked (approx. 33% and 34% respectively)</a:t>
             </a:r>
           </a:p>
           <a:p>
@@ -3883,7 +4501,7 @@
             </a:pPr>
             <a:r>
               <a:rPr lang="en-GB" dirty="0"/>
-              <a:t> Investments in Intellectual property products in the UK is lagging compared to Germany &amp; France and accounts to a small portion of the UK productivity</a:t>
+              <a:t> Investments in Intellectual property products in the UK is lagging compared to Germany &amp; France and accounts to a small portion of the UK productivity (approx. 17%)</a:t>
             </a:r>
           </a:p>
           <a:p>
@@ -3903,32 +4521,8 @@
             </a:pPr>
             <a:r>
               <a:rPr lang="en-GB" dirty="0"/>
-              <a:t> Lack of adequate mental health data did not allow for any assessments of its impact in productivity</a:t>
-            </a:r>
-          </a:p>
-          <a:p>
-            <a:pPr>
-              <a:buFont typeface="Wingdings" panose="05000000000000000000" pitchFamily="2" charset="2"/>
-              <a:buChar char="§"/>
-            </a:pPr>
-            <a:r>
-              <a:rPr lang="en-GB" dirty="0"/>
-              <a:t> A detailed study of the French and German economy should be undertaken to identify areas of improvement in the UK  </a:t>
-            </a:r>
-          </a:p>
-          <a:p>
-            <a:pPr>
-              <a:buFont typeface="Wingdings" panose="05000000000000000000" pitchFamily="2" charset="2"/>
-              <a:buChar char="§"/>
-            </a:pPr>
-            <a:endParaRPr lang="en-GB" dirty="0"/>
-          </a:p>
-          <a:p>
-            <a:pPr>
-              <a:buFont typeface="Wingdings" panose="05000000000000000000" pitchFamily="2" charset="2"/>
-              <a:buChar char="§"/>
-            </a:pPr>
-            <a:endParaRPr lang="en-GB" dirty="0"/>
+              <a:t> Lack of adequate Mental Health data did not allow for any assessments of its impact in productivity</a:t>
+            </a:r>
           </a:p>
         </p:txBody>
       </p:sp>
@@ -3945,7 +4539,114 @@
 </p:sld>
 </file>
 
-<file path=ppt/slides/slide11.xml><?xml version="1.0" encoding="utf-8"?>
+<file path=ppt/slides/slide12.xml><?xml version="1.0" encoding="utf-8"?>
+<p:sld xmlns:a="http://schemas.openxmlformats.org/drawingml/2006/main" xmlns:r="http://schemas.openxmlformats.org/officeDocument/2006/relationships" xmlns:p="http://schemas.openxmlformats.org/presentationml/2006/main">
+  <p:cSld>
+    <p:spTree>
+      <p:nvGrpSpPr>
+        <p:cNvPr id="1" name=""/>
+        <p:cNvGrpSpPr/>
+        <p:nvPr/>
+      </p:nvGrpSpPr>
+      <p:grpSpPr>
+        <a:xfrm>
+          <a:off x="0" y="0"/>
+          <a:ext cx="0" cy="0"/>
+          <a:chOff x="0" y="0"/>
+          <a:chExt cx="0" cy="0"/>
+        </a:xfrm>
+      </p:grpSpPr>
+      <p:sp>
+        <p:nvSpPr>
+          <p:cNvPr id="2" name="Title 1">
+            <a:extLst>
+              <a:ext uri="{FF2B5EF4-FFF2-40B4-BE49-F238E27FC236}">
+                <a16:creationId xmlns:a16="http://schemas.microsoft.com/office/drawing/2014/main" id="{A61F09B2-9332-DFE8-F39B-CC925D5AB69A}"/>
+              </a:ext>
+            </a:extLst>
+          </p:cNvPr>
+          <p:cNvSpPr>
+            <a:spLocks noGrp="1"/>
+          </p:cNvSpPr>
+          <p:nvPr>
+            <p:ph type="title"/>
+          </p:nvPr>
+        </p:nvSpPr>
+        <p:spPr>
+          <a:xfrm>
+            <a:off x="1097280" y="246276"/>
+            <a:ext cx="10058400" cy="1450757"/>
+          </a:xfrm>
+        </p:spPr>
+        <p:txBody>
+          <a:bodyPr/>
+          <a:lstStyle/>
+          <a:p>
+            <a:r>
+              <a:rPr lang="en-GB" dirty="0"/>
+              <a:t>Recommendations</a:t>
+            </a:r>
+          </a:p>
+        </p:txBody>
+      </p:sp>
+      <p:sp>
+        <p:nvSpPr>
+          <p:cNvPr id="3" name="Content Placeholder 2">
+            <a:extLst>
+              <a:ext uri="{FF2B5EF4-FFF2-40B4-BE49-F238E27FC236}">
+                <a16:creationId xmlns:a16="http://schemas.microsoft.com/office/drawing/2014/main" id="{AF5F0330-6F36-1ACD-FAC1-6E6AFAF82EED}"/>
+              </a:ext>
+            </a:extLst>
+          </p:cNvPr>
+          <p:cNvSpPr>
+            <a:spLocks noGrp="1"/>
+          </p:cNvSpPr>
+          <p:nvPr>
+            <p:ph idx="1"/>
+          </p:nvPr>
+        </p:nvSpPr>
+        <p:spPr/>
+        <p:txBody>
+          <a:bodyPr>
+            <a:normAutofit/>
+          </a:bodyPr>
+          <a:lstStyle/>
+          <a:p>
+            <a:pPr>
+              <a:buFont typeface="Wingdings" panose="05000000000000000000" pitchFamily="2" charset="2"/>
+              <a:buChar char="§"/>
+            </a:pPr>
+            <a:r>
+              <a:rPr lang="en-GB" dirty="0"/>
+              <a:t> Investments in Education and key economic activities are vital to increasing productivity in the UK </a:t>
+            </a:r>
+          </a:p>
+          <a:p>
+            <a:pPr>
+              <a:buFont typeface="Wingdings" panose="05000000000000000000" pitchFamily="2" charset="2"/>
+              <a:buChar char="§"/>
+            </a:pPr>
+            <a:r>
+              <a:rPr lang="en-GB" dirty="0"/>
+              <a:t> A detailed study of the French and German economy may identify areas of improvement in the UK  </a:t>
+            </a:r>
+          </a:p>
+        </p:txBody>
+      </p:sp>
+    </p:spTree>
+    <p:extLst>
+      <p:ext uri="{BB962C8B-B14F-4D97-AF65-F5344CB8AC3E}">
+        <p14:creationId xmlns:p14="http://schemas.microsoft.com/office/powerpoint/2010/main" val="1324060412"/>
+      </p:ext>
+    </p:extLst>
+  </p:cSld>
+  <p:clrMapOvr>
+    <a:masterClrMapping/>
+  </p:clrMapOvr>
+</p:sld>
+</file>
+
+<file path=ppt/slides/slide13.xml><?xml version="1.0" encoding="utf-8"?>
 <p:sld xmlns:a="http://schemas.openxmlformats.org/drawingml/2006/main" xmlns:r="http://schemas.openxmlformats.org/officeDocument/2006/relationships" xmlns:p="http://schemas.openxmlformats.org/presentationml/2006/main">
   <p:cSld>
     <p:spTree>
@@ -4169,7 +4870,7 @@
             </a:pPr>
             <a:r>
               <a:rPr lang="en-GB" dirty="0"/>
-              <a:t>Challenges</a:t>
+              <a:t> Challenges</a:t>
             </a:r>
           </a:p>
           <a:p>
@@ -4299,7 +5000,7 @@
               <a:buNone/>
             </a:pPr>
             <a:r>
-              <a:rPr lang="en-GB" u="sng" dirty="0"/>
+              <a:rPr lang="en-GB" b="1" u="sng" dirty="0"/>
               <a:t>The Business Problem</a:t>
             </a:r>
           </a:p>
@@ -4327,7 +5028,7 @@
               <a:buNone/>
             </a:pPr>
             <a:r>
-              <a:rPr lang="en-GB" u="sng" dirty="0"/>
+              <a:rPr lang="en-GB" b="1" u="sng" dirty="0"/>
               <a:t>The Business Questions</a:t>
             </a:r>
           </a:p>
@@ -4337,7 +5038,15 @@
             </a:pPr>
             <a:r>
               <a:rPr lang="en-GB" dirty="0"/>
-              <a:t>How can we improve productivity within Scotland and the UK overall?  </a:t>
+              <a:t>How can we </a:t>
+            </a:r>
+            <a:r>
+              <a:rPr lang="en-GB" b="1" dirty="0"/>
+              <a:t>improve productivity</a:t>
+            </a:r>
+            <a:r>
+              <a:rPr lang="en-GB" dirty="0"/>
+              <a:t> within Scotland and the UK overall?  </a:t>
             </a:r>
           </a:p>
           <a:p>
@@ -4381,7 +5090,15 @@
             </a:pPr>
             <a:r>
               <a:rPr lang="en-GB" dirty="0"/>
-              <a:t> Is there a relationship between government investment and productivity? </a:t>
+              <a:t> Is there a </a:t>
+            </a:r>
+            <a:r>
+              <a:rPr lang="en-GB" b="1" dirty="0"/>
+              <a:t>relationship</a:t>
+            </a:r>
+            <a:r>
+              <a:rPr lang="en-GB" dirty="0"/>
+              <a:t> between government investment and productivity? </a:t>
             </a:r>
           </a:p>
           <a:p>
@@ -4391,13 +5108,16 @@
             </a:pPr>
             <a:r>
               <a:rPr lang="en-GB" dirty="0"/>
-              <a:t> Can you predict productivity based </a:t>
-            </a:r>
-            <a:r>
-              <a:rPr lang="en-GB"/>
-              <a:t>on investment?</a:t>
-            </a:r>
-            <a:endParaRPr lang="en-GB" dirty="0"/>
+              <a:t> Can you </a:t>
+            </a:r>
+            <a:r>
+              <a:rPr lang="en-GB" b="1" dirty="0"/>
+              <a:t>predict </a:t>
+            </a:r>
+            <a:r>
+              <a:rPr lang="en-GB" dirty="0"/>
+              <a:t>productivity based on investment?</a:t>
+            </a:r>
           </a:p>
           <a:p>
             <a:pPr marL="0" indent="0">
@@ -5415,8 +6135,8 @@
         </p:nvSpPr>
         <p:spPr>
           <a:xfrm>
-            <a:off x="541324" y="2017562"/>
-            <a:ext cx="4814199" cy="369332"/>
+            <a:off x="615952" y="1925229"/>
+            <a:ext cx="4814199" cy="1200329"/>
           </a:xfrm>
           <a:prstGeom prst="rect">
             <a:avLst/>
@@ -5438,6 +6158,23 @@
               <a:t>UK productivity growth dropped after 2008</a:t>
             </a:r>
           </a:p>
+          <a:p>
+            <a:pPr marL="285750" indent="-285750">
+              <a:buFont typeface="Wingdings" panose="05000000000000000000" pitchFamily="2" charset="2"/>
+              <a:buChar char="§"/>
+            </a:pPr>
+            <a:r>
+              <a:rPr lang="en-GB" dirty="0"/>
+              <a:t>UK productivity among G-7 countries is somewhere in the middle</a:t>
+            </a:r>
+          </a:p>
+          <a:p>
+            <a:pPr marL="285750" indent="-285750">
+              <a:buFont typeface="Wingdings" panose="05000000000000000000" pitchFamily="2" charset="2"/>
+              <a:buChar char="§"/>
+            </a:pPr>
+            <a:endParaRPr lang="en-GB" dirty="0"/>
+          </a:p>
         </p:txBody>
       </p:sp>
       <p:sp>
@@ -5454,8 +6191,8 @@
         </p:nvSpPr>
         <p:spPr>
           <a:xfrm>
-            <a:off x="6908727" y="1925229"/>
-            <a:ext cx="4814199" cy="923330"/>
+            <a:off x="6454777" y="1925229"/>
+            <a:ext cx="5070474" cy="369332"/>
           </a:xfrm>
           <a:prstGeom prst="rect">
             <a:avLst/>
@@ -5474,17 +6211,7 @@
             </a:pPr>
             <a:r>
               <a:rPr lang="en-GB" dirty="0"/>
-              <a:t>Overall, the UK is not ranking high</a:t>
-            </a:r>
-          </a:p>
-          <a:p>
-            <a:pPr marL="285750" indent="-285750">
-              <a:buFont typeface="Wingdings" panose="05000000000000000000" pitchFamily="2" charset="2"/>
-              <a:buChar char="§"/>
-            </a:pPr>
-            <a:r>
-              <a:rPr lang="en-GB" dirty="0"/>
-              <a:t>UK productivity among G-7 countries is somewhere in the middle</a:t>
+              <a:t>Overall, the UK productivity is not ranking high</a:t>
             </a:r>
           </a:p>
         </p:txBody>
@@ -5521,10 +6248,10 @@
       </p:grpSpPr>
       <p:pic>
         <p:nvPicPr>
-          <p:cNvPr id="2" name="Picture 1">
+          <p:cNvPr id="3" name="Content Placeholder 9">
             <a:extLst>
               <a:ext uri="{FF2B5EF4-FFF2-40B4-BE49-F238E27FC236}">
-                <a16:creationId xmlns:a16="http://schemas.microsoft.com/office/drawing/2014/main" id="{B667A246-663C-147C-7761-2E561EC12C91}"/>
+                <a16:creationId xmlns:a16="http://schemas.microsoft.com/office/drawing/2014/main" id="{D9053730-81CE-686C-648F-5F9DFBD5ECEB}"/>
               </a:ext>
             </a:extLst>
           </p:cNvPr>
@@ -5541,8 +6268,8 @@
         </p:blipFill>
         <p:spPr>
           <a:xfrm>
-            <a:off x="8374046" y="209712"/>
-            <a:ext cx="3658781" cy="2076358"/>
+            <a:off x="315559" y="147022"/>
+            <a:ext cx="4542191" cy="3554263"/>
           </a:xfrm>
           <a:prstGeom prst="rect">
             <a:avLst/>
@@ -5551,10 +6278,10 @@
       </p:pic>
       <p:pic>
         <p:nvPicPr>
-          <p:cNvPr id="3" name="Content Placeholder 9">
+          <p:cNvPr id="4" name="Picture 3">
             <a:extLst>
               <a:ext uri="{FF2B5EF4-FFF2-40B4-BE49-F238E27FC236}">
-                <a16:creationId xmlns:a16="http://schemas.microsoft.com/office/drawing/2014/main" id="{EF92F899-25B3-92B0-D504-1E7BE36A7B72}"/>
+                <a16:creationId xmlns:a16="http://schemas.microsoft.com/office/drawing/2014/main" id="{A6C074C4-470E-D157-6555-A4918CDD5886}"/>
               </a:ext>
             </a:extLst>
           </p:cNvPr>
@@ -5571,50 +6298,58 @@
         </p:blipFill>
         <p:spPr>
           <a:xfrm>
-            <a:off x="200737" y="108665"/>
-            <a:ext cx="3013039" cy="2357702"/>
+            <a:off x="5666250" y="147022"/>
+            <a:ext cx="6413835" cy="3958252"/>
           </a:xfrm>
           <a:prstGeom prst="rect">
             <a:avLst/>
           </a:prstGeom>
         </p:spPr>
       </p:pic>
-      <p:pic>
-        <p:nvPicPr>
-          <p:cNvPr id="4" name="Picture 3">
+      <p:sp>
+        <p:nvSpPr>
+          <p:cNvPr id="5" name="TextBox 4">
             <a:extLst>
               <a:ext uri="{FF2B5EF4-FFF2-40B4-BE49-F238E27FC236}">
-                <a16:creationId xmlns:a16="http://schemas.microsoft.com/office/drawing/2014/main" id="{DEE0E4EA-384D-1769-C4C6-8CDF32DC1743}"/>
+                <a16:creationId xmlns:a16="http://schemas.microsoft.com/office/drawing/2014/main" id="{0B8DAF3C-41F9-E4CA-04B2-2AEA24874A72}"/>
               </a:ext>
             </a:extLst>
           </p:cNvPr>
-          <p:cNvPicPr>
-            <a:picLocks noChangeAspect="1"/>
-          </p:cNvPicPr>
+          <p:cNvSpPr txBox="1"/>
           <p:nvPr/>
-        </p:nvPicPr>
-        <p:blipFill>
-          <a:blip r:embed="rId4"/>
-          <a:stretch>
-            <a:fillRect/>
-          </a:stretch>
-        </p:blipFill>
+        </p:nvSpPr>
         <p:spPr>
           <a:xfrm>
-            <a:off x="3713467" y="44680"/>
-            <a:ext cx="4120152" cy="2542722"/>
+            <a:off x="83340" y="3708185"/>
+            <a:ext cx="5429917" cy="246221"/>
           </a:xfrm>
           <a:prstGeom prst="rect">
             <a:avLst/>
           </a:prstGeom>
+          <a:noFill/>
         </p:spPr>
-      </p:pic>
+        <p:txBody>
+          <a:bodyPr wrap="square">
+            <a:spAutoFit/>
+          </a:bodyPr>
+          <a:lstStyle/>
+          <a:p>
+            <a:r>
+              <a:rPr lang="en-GB" sz="1000" dirty="0">
+                <a:hlinkClick r:id="rId4"/>
+              </a:rPr>
+              <a:t>https://www.wikiwand.com/en/Financial_and_social_rankings_of_sovereign_states_in_Europe</a:t>
+            </a:r>
+            <a:endParaRPr lang="en-GB" sz="1000" dirty="0"/>
+          </a:p>
+        </p:txBody>
+      </p:sp>
       <p:pic>
         <p:nvPicPr>
-          <p:cNvPr id="5" name="Picture 4">
+          <p:cNvPr id="6" name="Picture 5">
             <a:extLst>
               <a:ext uri="{FF2B5EF4-FFF2-40B4-BE49-F238E27FC236}">
-                <a16:creationId xmlns:a16="http://schemas.microsoft.com/office/drawing/2014/main" id="{44B00FE5-31F3-A80C-C416-BED0562C93FE}"/>
+                <a16:creationId xmlns:a16="http://schemas.microsoft.com/office/drawing/2014/main" id="{6F5C7312-A871-4E01-F7C2-42EC5E2641BE}"/>
               </a:ext>
             </a:extLst>
           </p:cNvPr>
@@ -5631,8 +6366,8 @@
         </p:blipFill>
         <p:spPr>
           <a:xfrm>
-            <a:off x="6231351" y="2825848"/>
-            <a:ext cx="5735036" cy="3539336"/>
+            <a:off x="6181725" y="3831296"/>
+            <a:ext cx="4460623" cy="2531403"/>
           </a:xfrm>
           <a:prstGeom prst="rect">
             <a:avLst/>
@@ -5641,121 +6376,293 @@
       </p:pic>
       <p:sp>
         <p:nvSpPr>
-          <p:cNvPr id="6" name="TextBox 5">
+          <p:cNvPr id="8" name="Content Placeholder 2">
             <a:extLst>
               <a:ext uri="{FF2B5EF4-FFF2-40B4-BE49-F238E27FC236}">
-                <a16:creationId xmlns:a16="http://schemas.microsoft.com/office/drawing/2014/main" id="{CE663B51-FF13-4DC1-DECC-2A130889DA48}"/>
+                <a16:creationId xmlns:a16="http://schemas.microsoft.com/office/drawing/2014/main" id="{7CA8C05D-508C-A3AF-E32F-49DAC0C7F4EA}"/>
               </a:ext>
             </a:extLst>
           </p:cNvPr>
-          <p:cNvSpPr txBox="1"/>
+          <p:cNvSpPr txBox="1">
+            <a:spLocks/>
+          </p:cNvSpPr>
           <p:nvPr/>
         </p:nvSpPr>
         <p:spPr>
           <a:xfrm>
-            <a:off x="93254" y="2494075"/>
-            <a:ext cx="3347743" cy="184666"/>
-          </a:xfrm>
-          <a:prstGeom prst="rect">
-            <a:avLst/>
-          </a:prstGeom>
-          <a:noFill/>
-        </p:spPr>
-        <p:txBody>
-          <a:bodyPr wrap="square">
-            <a:spAutoFit/>
-          </a:bodyPr>
-          <a:lstStyle/>
-          <a:p>
-            <a:r>
-              <a:rPr lang="en-GB" sz="600" dirty="0">
-                <a:hlinkClick r:id="rId6"/>
-              </a:rPr>
-              <a:t>https://www.wikiwand.com/en/Financial_and_social_rankings_of_sovereign_states_in_Europe</a:t>
-            </a:r>
-            <a:endParaRPr lang="en-GB" sz="600" dirty="0"/>
-          </a:p>
-        </p:txBody>
-      </p:sp>
-      <p:sp>
-        <p:nvSpPr>
-          <p:cNvPr id="7" name="AutoShape 2">
-            <a:extLst>
-              <a:ext uri="{FF2B5EF4-FFF2-40B4-BE49-F238E27FC236}">
-                <a16:creationId xmlns:a16="http://schemas.microsoft.com/office/drawing/2014/main" id="{40B82ECA-69A4-0CB0-6313-FAD2A78CC50F}"/>
-              </a:ext>
-            </a:extLst>
-          </p:cNvPr>
-          <p:cNvSpPr>
-            <a:spLocks noChangeAspect="1" noChangeArrowheads="1"/>
-          </p:cNvSpPr>
-          <p:nvPr/>
-        </p:nvSpPr>
-        <p:spPr bwMode="auto">
-          <a:xfrm>
-            <a:off x="5943600" y="3276600"/>
-            <a:ext cx="304800" cy="304800"/>
-          </a:xfrm>
-          <a:prstGeom prst="rect">
-            <a:avLst/>
-          </a:prstGeom>
-          <a:noFill/>
-          <a:extLst>
-            <a:ext uri="{909E8E84-426E-40DD-AFC4-6F175D3DCCD1}">
-              <a14:hiddenFill xmlns:a14="http://schemas.microsoft.com/office/drawing/2010/main">
-                <a:solidFill>
-                  <a:srgbClr val="FFFFFF"/>
-                </a:solidFill>
-              </a14:hiddenFill>
-            </a:ext>
-          </a:extLst>
-        </p:spPr>
-        <p:txBody>
-          <a:bodyPr vert="horz" wrap="square" lIns="91440" tIns="45720" rIns="91440" bIns="45720" numCol="1" anchor="t" anchorCtr="0" compatLnSpc="1">
-            <a:prstTxWarp prst="textNoShape">
-              <a:avLst/>
-            </a:prstTxWarp>
-          </a:bodyPr>
-          <a:lstStyle/>
-          <a:p>
-            <a:endParaRPr lang="en-GB"/>
-          </a:p>
-        </p:txBody>
-      </p:sp>
-      <p:pic>
-        <p:nvPicPr>
-          <p:cNvPr id="8" name="Picture 7">
-            <a:extLst>
-              <a:ext uri="{FF2B5EF4-FFF2-40B4-BE49-F238E27FC236}">
-                <a16:creationId xmlns:a16="http://schemas.microsoft.com/office/drawing/2014/main" id="{58619A7B-4707-B2E4-3B79-C6A3D5BA9816}"/>
-              </a:ext>
-            </a:extLst>
-          </p:cNvPr>
-          <p:cNvPicPr>
-            <a:picLocks noChangeAspect="1"/>
-          </p:cNvPicPr>
-          <p:nvPr/>
-        </p:nvPicPr>
-        <p:blipFill>
-          <a:blip r:embed="rId7"/>
-          <a:stretch>
-            <a:fillRect/>
-          </a:stretch>
-        </p:blipFill>
-        <p:spPr>
-          <a:xfrm>
-            <a:off x="315631" y="2825848"/>
-            <a:ext cx="5735034" cy="3539336"/>
+            <a:off x="210784" y="4325471"/>
+            <a:ext cx="5561366" cy="1543052"/>
           </a:xfrm>
           <a:prstGeom prst="rect">
             <a:avLst/>
           </a:prstGeom>
         </p:spPr>
-      </p:pic>
+        <p:txBody>
+          <a:bodyPr/>
+          <a:lstStyle>
+            <a:lvl1pPr marL="91440" indent="-91440" algn="l" defTabSz="914400" rtl="0" eaLnBrk="1" latinLnBrk="0" hangingPunct="1">
+              <a:lnSpc>
+                <a:spcPct val="110000"/>
+              </a:lnSpc>
+              <a:spcBef>
+                <a:spcPts val="1200"/>
+              </a:spcBef>
+              <a:spcAft>
+                <a:spcPts val="200"/>
+              </a:spcAft>
+              <a:buClr>
+                <a:schemeClr val="accent1"/>
+              </a:buClr>
+              <a:buSzPct val="100000"/>
+              <a:buFont typeface="Calibri" panose="020F0502020204030204" pitchFamily="34" charset="0"/>
+              <a:buChar char=" "/>
+              <a:defRPr sz="1900" kern="1200">
+                <a:solidFill>
+                  <a:schemeClr val="tx1">
+                    <a:lumMod val="75000"/>
+                    <a:lumOff val="25000"/>
+                  </a:schemeClr>
+                </a:solidFill>
+                <a:latin typeface="+mn-lt"/>
+                <a:ea typeface="+mn-ea"/>
+                <a:cs typeface="+mn-cs"/>
+              </a:defRPr>
+            </a:lvl1pPr>
+            <a:lvl2pPr marL="384048" indent="-182880" algn="l" defTabSz="914400" rtl="0" eaLnBrk="1" latinLnBrk="0" hangingPunct="1">
+              <a:lnSpc>
+                <a:spcPct val="100000"/>
+              </a:lnSpc>
+              <a:spcBef>
+                <a:spcPts val="200"/>
+              </a:spcBef>
+              <a:spcAft>
+                <a:spcPts val="400"/>
+              </a:spcAft>
+              <a:buClrTx/>
+              <a:buFont typeface="Calibri" pitchFamily="34" charset="0"/>
+              <a:buChar char="◦"/>
+              <a:defRPr sz="1700" kern="1200">
+                <a:solidFill>
+                  <a:schemeClr val="tx1">
+                    <a:lumMod val="75000"/>
+                    <a:lumOff val="25000"/>
+                  </a:schemeClr>
+                </a:solidFill>
+                <a:latin typeface="+mn-lt"/>
+                <a:ea typeface="+mn-ea"/>
+                <a:cs typeface="+mn-cs"/>
+              </a:defRPr>
+            </a:lvl2pPr>
+            <a:lvl3pPr marL="566928" indent="-182880" algn="l" defTabSz="914400" rtl="0" eaLnBrk="1" latinLnBrk="0" hangingPunct="1">
+              <a:lnSpc>
+                <a:spcPct val="100000"/>
+              </a:lnSpc>
+              <a:spcBef>
+                <a:spcPts val="200"/>
+              </a:spcBef>
+              <a:spcAft>
+                <a:spcPts val="400"/>
+              </a:spcAft>
+              <a:buClrTx/>
+              <a:buFont typeface="Calibri" pitchFamily="34" charset="0"/>
+              <a:buChar char="◦"/>
+              <a:defRPr sz="1300" kern="1200">
+                <a:solidFill>
+                  <a:schemeClr val="tx1">
+                    <a:lumMod val="75000"/>
+                    <a:lumOff val="25000"/>
+                  </a:schemeClr>
+                </a:solidFill>
+                <a:latin typeface="+mn-lt"/>
+                <a:ea typeface="+mn-ea"/>
+                <a:cs typeface="+mn-cs"/>
+              </a:defRPr>
+            </a:lvl3pPr>
+            <a:lvl4pPr marL="749808" indent="-182880" algn="l" defTabSz="914400" rtl="0" eaLnBrk="1" latinLnBrk="0" hangingPunct="1">
+              <a:lnSpc>
+                <a:spcPct val="100000"/>
+              </a:lnSpc>
+              <a:spcBef>
+                <a:spcPts val="200"/>
+              </a:spcBef>
+              <a:spcAft>
+                <a:spcPts val="400"/>
+              </a:spcAft>
+              <a:buClrTx/>
+              <a:buFont typeface="Calibri" pitchFamily="34" charset="0"/>
+              <a:buChar char="◦"/>
+              <a:defRPr sz="1300" kern="1200">
+                <a:solidFill>
+                  <a:schemeClr val="tx1">
+                    <a:lumMod val="75000"/>
+                    <a:lumOff val="25000"/>
+                  </a:schemeClr>
+                </a:solidFill>
+                <a:latin typeface="+mn-lt"/>
+                <a:ea typeface="+mn-ea"/>
+                <a:cs typeface="+mn-cs"/>
+              </a:defRPr>
+            </a:lvl4pPr>
+            <a:lvl5pPr marL="932688" indent="-182880" algn="l" defTabSz="914400" rtl="0" eaLnBrk="1" latinLnBrk="0" hangingPunct="1">
+              <a:lnSpc>
+                <a:spcPct val="100000"/>
+              </a:lnSpc>
+              <a:spcBef>
+                <a:spcPts val="200"/>
+              </a:spcBef>
+              <a:spcAft>
+                <a:spcPts val="400"/>
+              </a:spcAft>
+              <a:buClrTx/>
+              <a:buFont typeface="Calibri" pitchFamily="34" charset="0"/>
+              <a:buChar char="◦"/>
+              <a:defRPr sz="1300" kern="1200">
+                <a:solidFill>
+                  <a:schemeClr val="tx1">
+                    <a:lumMod val="75000"/>
+                    <a:lumOff val="25000"/>
+                  </a:schemeClr>
+                </a:solidFill>
+                <a:latin typeface="+mn-lt"/>
+                <a:ea typeface="+mn-ea"/>
+                <a:cs typeface="+mn-cs"/>
+              </a:defRPr>
+            </a:lvl5pPr>
+            <a:lvl6pPr marL="1100000" indent="-228600" algn="l" defTabSz="914400" rtl="0" eaLnBrk="1" latinLnBrk="0" hangingPunct="1">
+              <a:lnSpc>
+                <a:spcPct val="90000"/>
+              </a:lnSpc>
+              <a:spcBef>
+                <a:spcPts val="200"/>
+              </a:spcBef>
+              <a:spcAft>
+                <a:spcPts val="400"/>
+              </a:spcAft>
+              <a:buClr>
+                <a:schemeClr val="accent1"/>
+              </a:buClr>
+              <a:buFont typeface="Calibri" pitchFamily="34" charset="0"/>
+              <a:buChar char="◦"/>
+              <a:defRPr sz="1400" kern="1200">
+                <a:solidFill>
+                  <a:schemeClr val="tx1">
+                    <a:lumMod val="75000"/>
+                    <a:lumOff val="25000"/>
+                  </a:schemeClr>
+                </a:solidFill>
+                <a:latin typeface="+mn-lt"/>
+                <a:ea typeface="+mn-ea"/>
+                <a:cs typeface="+mn-cs"/>
+              </a:defRPr>
+            </a:lvl6pPr>
+            <a:lvl7pPr marL="1300000" indent="-228600" algn="l" defTabSz="914400" rtl="0" eaLnBrk="1" latinLnBrk="0" hangingPunct="1">
+              <a:lnSpc>
+                <a:spcPct val="90000"/>
+              </a:lnSpc>
+              <a:spcBef>
+                <a:spcPts val="200"/>
+              </a:spcBef>
+              <a:spcAft>
+                <a:spcPts val="400"/>
+              </a:spcAft>
+              <a:buClr>
+                <a:schemeClr val="accent1"/>
+              </a:buClr>
+              <a:buFont typeface="Calibri" pitchFamily="34" charset="0"/>
+              <a:buChar char="◦"/>
+              <a:defRPr sz="1400" kern="1200">
+                <a:solidFill>
+                  <a:schemeClr val="tx1">
+                    <a:lumMod val="75000"/>
+                    <a:lumOff val="25000"/>
+                  </a:schemeClr>
+                </a:solidFill>
+                <a:latin typeface="+mn-lt"/>
+                <a:ea typeface="+mn-ea"/>
+                <a:cs typeface="+mn-cs"/>
+              </a:defRPr>
+            </a:lvl7pPr>
+            <a:lvl8pPr marL="1500000" indent="-228600" algn="l" defTabSz="914400" rtl="0" eaLnBrk="1" latinLnBrk="0" hangingPunct="1">
+              <a:lnSpc>
+                <a:spcPct val="90000"/>
+              </a:lnSpc>
+              <a:spcBef>
+                <a:spcPts val="200"/>
+              </a:spcBef>
+              <a:spcAft>
+                <a:spcPts val="400"/>
+              </a:spcAft>
+              <a:buClr>
+                <a:schemeClr val="accent1"/>
+              </a:buClr>
+              <a:buFont typeface="Calibri" pitchFamily="34" charset="0"/>
+              <a:buChar char="◦"/>
+              <a:defRPr sz="1400" kern="1200">
+                <a:solidFill>
+                  <a:schemeClr val="tx1">
+                    <a:lumMod val="75000"/>
+                    <a:lumOff val="25000"/>
+                  </a:schemeClr>
+                </a:solidFill>
+                <a:latin typeface="+mn-lt"/>
+                <a:ea typeface="+mn-ea"/>
+                <a:cs typeface="+mn-cs"/>
+              </a:defRPr>
+            </a:lvl8pPr>
+            <a:lvl9pPr marL="1700000" indent="-228600" algn="l" defTabSz="914400" rtl="0" eaLnBrk="1" latinLnBrk="0" hangingPunct="1">
+              <a:lnSpc>
+                <a:spcPct val="90000"/>
+              </a:lnSpc>
+              <a:spcBef>
+                <a:spcPts val="200"/>
+              </a:spcBef>
+              <a:spcAft>
+                <a:spcPts val="400"/>
+              </a:spcAft>
+              <a:buClr>
+                <a:schemeClr val="accent1"/>
+              </a:buClr>
+              <a:buFont typeface="Calibri" pitchFamily="34" charset="0"/>
+              <a:buChar char="◦"/>
+              <a:defRPr sz="1400" kern="1200">
+                <a:solidFill>
+                  <a:schemeClr val="tx1">
+                    <a:lumMod val="75000"/>
+                    <a:lumOff val="25000"/>
+                  </a:schemeClr>
+                </a:solidFill>
+                <a:latin typeface="+mn-lt"/>
+                <a:ea typeface="+mn-ea"/>
+                <a:cs typeface="+mn-cs"/>
+              </a:defRPr>
+            </a:lvl9pPr>
+          </a:lstStyle>
+          <a:p>
+            <a:pPr marL="285750" indent="-285750">
+              <a:buFont typeface="Wingdings" panose="05000000000000000000" pitchFamily="2" charset="2"/>
+              <a:buChar char="§"/>
+            </a:pPr>
+            <a:r>
+              <a:rPr lang="en-GB" dirty="0"/>
+              <a:t> The UK is comparable to the economy of France and Germany</a:t>
+            </a:r>
+          </a:p>
+          <a:p>
+            <a:pPr marL="285750" indent="-285750">
+              <a:buFont typeface="Wingdings" panose="05000000000000000000" pitchFamily="2" charset="2"/>
+              <a:buChar char="§"/>
+            </a:pPr>
+            <a:r>
+              <a:rPr lang="en-GB" dirty="0"/>
+              <a:t>The UK is lagging behind France and Germany in productivity of key economic activities</a:t>
+            </a:r>
+          </a:p>
+        </p:txBody>
+      </p:sp>
     </p:spTree>
     <p:extLst>
       <p:ext uri="{BB962C8B-B14F-4D97-AF65-F5344CB8AC3E}">
-        <p14:creationId xmlns:p14="http://schemas.microsoft.com/office/powerpoint/2010/main" val="3383321252"/>
+        <p14:creationId xmlns:p14="http://schemas.microsoft.com/office/powerpoint/2010/main" val="1619733988"/>
       </p:ext>
     </p:extLst>
   </p:cSld>
@@ -5784,38 +6691,114 @@
       </p:grpSpPr>
       <p:sp>
         <p:nvSpPr>
-          <p:cNvPr id="2" name="Title 1">
+          <p:cNvPr id="7" name="AutoShape 2">
             <a:extLst>
               <a:ext uri="{FF2B5EF4-FFF2-40B4-BE49-F238E27FC236}">
-                <a16:creationId xmlns:a16="http://schemas.microsoft.com/office/drawing/2014/main" id="{80EFE8AC-1E6F-C1D3-E1AF-D65EF9149E1B}"/>
+                <a16:creationId xmlns:a16="http://schemas.microsoft.com/office/drawing/2014/main" id="{40B82ECA-69A4-0CB0-6313-FAD2A78CC50F}"/>
               </a:ext>
             </a:extLst>
           </p:cNvPr>
           <p:cNvSpPr>
-            <a:spLocks noGrp="1"/>
+            <a:spLocks noChangeAspect="1" noChangeArrowheads="1"/>
           </p:cNvSpPr>
-          <p:nvPr>
-            <p:ph type="title"/>
-          </p:nvPr>
-        </p:nvSpPr>
-        <p:spPr/>
+          <p:nvPr/>
+        </p:nvSpPr>
+        <p:spPr bwMode="auto">
+          <a:xfrm>
+            <a:off x="5943600" y="3276600"/>
+            <a:ext cx="304800" cy="304800"/>
+          </a:xfrm>
+          <a:prstGeom prst="rect">
+            <a:avLst/>
+          </a:prstGeom>
+          <a:noFill/>
+          <a:extLst>
+            <a:ext uri="{909E8E84-426E-40DD-AFC4-6F175D3DCCD1}">
+              <a14:hiddenFill xmlns:a14="http://schemas.microsoft.com/office/drawing/2010/main">
+                <a:solidFill>
+                  <a:srgbClr val="FFFFFF"/>
+                </a:solidFill>
+              </a14:hiddenFill>
+            </a:ext>
+          </a:extLst>
+        </p:spPr>
         <p:txBody>
-          <a:bodyPr/>
+          <a:bodyPr vert="horz" wrap="square" lIns="91440" tIns="45720" rIns="91440" bIns="45720" numCol="1" anchor="t" anchorCtr="0" compatLnSpc="1">
+            <a:prstTxWarp prst="textNoShape">
+              <a:avLst/>
+            </a:prstTxWarp>
+          </a:bodyPr>
           <a:lstStyle/>
           <a:p>
-            <a:r>
-              <a:rPr lang="en-GB" dirty="0"/>
-              <a:t>Prediction of Productivity Based on Investment</a:t>
-            </a:r>
+            <a:endParaRPr lang="en-GB"/>
           </a:p>
         </p:txBody>
       </p:sp>
-      <p:sp>
-        <p:nvSpPr>
-          <p:cNvPr id="7" name="Content Placeholder 2">
+      <p:pic>
+        <p:nvPicPr>
+          <p:cNvPr id="8" name="Picture 7">
             <a:extLst>
               <a:ext uri="{FF2B5EF4-FFF2-40B4-BE49-F238E27FC236}">
-                <a16:creationId xmlns:a16="http://schemas.microsoft.com/office/drawing/2014/main" id="{973B8575-F29F-3B50-72B5-949FA7B34D1D}"/>
+                <a16:creationId xmlns:a16="http://schemas.microsoft.com/office/drawing/2014/main" id="{58619A7B-4707-B2E4-3B79-C6A3D5BA9816}"/>
+              </a:ext>
+            </a:extLst>
+          </p:cNvPr>
+          <p:cNvPicPr>
+            <a:picLocks noChangeAspect="1"/>
+          </p:cNvPicPr>
+          <p:nvPr/>
+        </p:nvPicPr>
+        <p:blipFill rotWithShape="1">
+          <a:blip r:embed="rId2"/>
+          <a:srcRect r="11024"/>
+          <a:stretch/>
+        </p:blipFill>
+        <p:spPr>
+          <a:xfrm>
+            <a:off x="88096" y="91298"/>
+            <a:ext cx="5622317" cy="3899678"/>
+          </a:xfrm>
+          <a:prstGeom prst="rect">
+            <a:avLst/>
+          </a:prstGeom>
+        </p:spPr>
+      </p:pic>
+      <p:pic>
+        <p:nvPicPr>
+          <p:cNvPr id="9" name="Picture 8">
+            <a:extLst>
+              <a:ext uri="{FF2B5EF4-FFF2-40B4-BE49-F238E27FC236}">
+                <a16:creationId xmlns:a16="http://schemas.microsoft.com/office/drawing/2014/main" id="{11FF516D-47F1-C499-33CC-9473C85CA704}"/>
+              </a:ext>
+            </a:extLst>
+          </p:cNvPr>
+          <p:cNvPicPr>
+            <a:picLocks noChangeAspect="1"/>
+          </p:cNvPicPr>
+          <p:nvPr/>
+        </p:nvPicPr>
+        <p:blipFill>
+          <a:blip r:embed="rId3"/>
+          <a:stretch>
+            <a:fillRect/>
+          </a:stretch>
+        </p:blipFill>
+        <p:spPr>
+          <a:xfrm>
+            <a:off x="5841998" y="91298"/>
+            <a:ext cx="6318923" cy="3899678"/>
+          </a:xfrm>
+          <a:prstGeom prst="rect">
+            <a:avLst/>
+          </a:prstGeom>
+        </p:spPr>
+      </p:pic>
+      <p:sp>
+        <p:nvSpPr>
+          <p:cNvPr id="10" name="Content Placeholder 2">
+            <a:extLst>
+              <a:ext uri="{FF2B5EF4-FFF2-40B4-BE49-F238E27FC236}">
+                <a16:creationId xmlns:a16="http://schemas.microsoft.com/office/drawing/2014/main" id="{0CA2A152-87E5-FFC3-CE8E-48DBB1665689}"/>
               </a:ext>
             </a:extLst>
           </p:cNvPr>
@@ -5826,8 +6809,8 @@
         </p:nvSpPr>
         <p:spPr>
           <a:xfrm>
-            <a:off x="1097280" y="2108201"/>
-            <a:ext cx="10058400" cy="3760891"/>
+            <a:off x="382765" y="4169126"/>
+            <a:ext cx="5327648" cy="2069747"/>
           </a:xfrm>
           <a:prstGeom prst="rect">
             <a:avLst/>
@@ -6080,203 +7063,370 @@
             </a:pPr>
             <a:r>
               <a:rPr lang="en-GB" dirty="0"/>
-              <a:t> Data from years 1995-2020 were used</a:t>
-            </a:r>
-          </a:p>
-          <a:p>
-            <a:pPr>
-              <a:buFont typeface="Wingdings" panose="05000000000000000000" pitchFamily="2" charset="2"/>
-              <a:buChar char="§"/>
-            </a:pPr>
-            <a:r>
-              <a:rPr lang="en-GB" dirty="0"/>
-              <a:t> Factors used to predict productivity</a:t>
-            </a:r>
-          </a:p>
-          <a:p>
-            <a:pPr lvl="4">
-              <a:buFont typeface="Wingdings" panose="05000000000000000000" pitchFamily="2" charset="2"/>
-              <a:buChar char="§"/>
-            </a:pPr>
-            <a:r>
-              <a:rPr lang="en-GB" sz="1600" dirty="0">
-                <a:solidFill>
-                  <a:srgbClr val="7570B3"/>
-                </a:solidFill>
-              </a:rPr>
-              <a:t>Intellectual Property ($billion)</a:t>
-            </a:r>
-          </a:p>
-          <a:p>
-            <a:pPr lvl="4">
-              <a:buFont typeface="Wingdings" panose="05000000000000000000" pitchFamily="2" charset="2"/>
-              <a:buChar char="§"/>
-            </a:pPr>
-            <a:r>
-              <a:rPr lang="en-GB" sz="1600" dirty="0">
-                <a:solidFill>
-                  <a:srgbClr val="D95F02"/>
-                </a:solidFill>
-              </a:rPr>
-              <a:t>Dwellings ($billion)</a:t>
-            </a:r>
-          </a:p>
-          <a:p>
-            <a:pPr lvl="4">
-              <a:buFont typeface="Wingdings" panose="05000000000000000000" pitchFamily="2" charset="2"/>
-              <a:buChar char="§"/>
-            </a:pPr>
-            <a:r>
-              <a:rPr lang="en-GB" sz="1600" dirty="0">
-                <a:solidFill>
-                  <a:srgbClr val="1B769F"/>
-                </a:solidFill>
-              </a:rPr>
-              <a:t>Cultivated biological resources ($billion)</a:t>
-            </a:r>
-          </a:p>
-          <a:p>
-            <a:pPr lvl="4">
-              <a:buFont typeface="Wingdings" panose="05000000000000000000" pitchFamily="2" charset="2"/>
-              <a:buChar char="§"/>
-            </a:pPr>
-            <a:r>
-              <a:rPr lang="en-GB" sz="1600" dirty="0">
-                <a:solidFill>
-                  <a:srgbClr val="E7298A"/>
-                </a:solidFill>
-              </a:rPr>
-              <a:t>Infrastructures ($billion)</a:t>
-            </a:r>
-          </a:p>
-          <a:p>
-            <a:pPr lvl="4">
-              <a:buFont typeface="Wingdings" panose="05000000000000000000" pitchFamily="2" charset="2"/>
-              <a:buChar char="§"/>
-            </a:pPr>
-            <a:r>
-              <a:rPr lang="en-GB" sz="1600" dirty="0">
-                <a:solidFill>
-                  <a:srgbClr val="E6AB02"/>
-                </a:solidFill>
-              </a:rPr>
-              <a:t>Transportation equipment ($billion)</a:t>
-            </a:r>
-          </a:p>
-          <a:p>
-            <a:pPr lvl="4">
-              <a:buFont typeface="Wingdings" panose="05000000000000000000" pitchFamily="2" charset="2"/>
-              <a:buChar char="§"/>
-            </a:pPr>
-            <a:r>
-              <a:rPr lang="en-GB" sz="1600" dirty="0">
-                <a:solidFill>
-                  <a:srgbClr val="66A61E"/>
-                </a:solidFill>
-              </a:rPr>
-              <a:t>Information and Communication Tech ($billion)</a:t>
-            </a:r>
-          </a:p>
-          <a:p>
-            <a:pPr>
-              <a:buFont typeface="Wingdings" panose="05000000000000000000" pitchFamily="2" charset="2"/>
-              <a:buChar char="§"/>
-            </a:pPr>
-            <a:r>
-              <a:rPr lang="en-GB" dirty="0"/>
-              <a:t> Education data were too scarce to use for modelling</a:t>
-            </a:r>
-          </a:p>
-          <a:p>
-            <a:pPr marL="201168" lvl="1" indent="0">
-              <a:buNone/>
-            </a:pPr>
-            <a:endParaRPr lang="en-GB" sz="1800" dirty="0">
-              <a:solidFill>
-                <a:srgbClr val="66A61E"/>
-              </a:solidFill>
-            </a:endParaRPr>
-          </a:p>
-          <a:p>
-            <a:pPr marL="201168" lvl="1" indent="0">
-              <a:buNone/>
-            </a:pPr>
-            <a:endParaRPr lang="en-GB" sz="1800" dirty="0">
-              <a:solidFill>
-                <a:srgbClr val="66A61E"/>
-              </a:solidFill>
-            </a:endParaRPr>
-          </a:p>
-          <a:p>
-            <a:pPr lvl="1">
-              <a:buFont typeface="Wingdings" panose="05000000000000000000" pitchFamily="2" charset="2"/>
-              <a:buChar char="§"/>
-            </a:pPr>
-            <a:endParaRPr lang="en-GB" sz="1800" dirty="0">
-              <a:solidFill>
-                <a:srgbClr val="66A61E"/>
-              </a:solidFill>
-            </a:endParaRPr>
-          </a:p>
-          <a:p>
-            <a:pPr marL="201168" lvl="1" indent="0">
-              <a:buNone/>
-            </a:pPr>
-            <a:endParaRPr lang="en-GB" sz="1800" dirty="0">
-              <a:solidFill>
-                <a:srgbClr val="66A61E"/>
-              </a:solidFill>
-            </a:endParaRPr>
-          </a:p>
-          <a:p>
-            <a:pPr lvl="1">
-              <a:buFont typeface="Wingdings" panose="05000000000000000000" pitchFamily="2" charset="2"/>
-              <a:buChar char="§"/>
-            </a:pPr>
-            <a:endParaRPr lang="en-GB" sz="1800" dirty="0"/>
-          </a:p>
-          <a:p>
-            <a:pPr lvl="1">
-              <a:buFont typeface="Wingdings" panose="05000000000000000000" pitchFamily="2" charset="2"/>
-              <a:buChar char="§"/>
-            </a:pPr>
-            <a:endParaRPr lang="en-GB" dirty="0"/>
+              <a:t> 20 European countries are compared in terms of productivity and investment in key assets incl. education</a:t>
+            </a:r>
           </a:p>
         </p:txBody>
       </p:sp>
-      <p:pic>
-        <p:nvPicPr>
-          <p:cNvPr id="5" name="Picture 4">
+      <p:sp>
+        <p:nvSpPr>
+          <p:cNvPr id="12" name="Content Placeholder 2">
             <a:extLst>
               <a:ext uri="{FF2B5EF4-FFF2-40B4-BE49-F238E27FC236}">
-                <a16:creationId xmlns:a16="http://schemas.microsoft.com/office/drawing/2014/main" id="{D7A01AAF-F7FB-9E28-CA64-5369C2008572}"/>
+                <a16:creationId xmlns:a16="http://schemas.microsoft.com/office/drawing/2014/main" id="{E7A08B36-81C5-B5BC-20C8-DCBF82BF1061}"/>
               </a:ext>
             </a:extLst>
           </p:cNvPr>
-          <p:cNvPicPr>
-            <a:picLocks noChangeAspect="1"/>
-          </p:cNvPicPr>
+          <p:cNvSpPr txBox="1">
+            <a:spLocks/>
+          </p:cNvSpPr>
           <p:nvPr/>
-        </p:nvPicPr>
-        <p:blipFill rotWithShape="1">
-          <a:blip r:embed="rId2"/>
-          <a:srcRect r="22431"/>
-          <a:stretch/>
-        </p:blipFill>
+        </p:nvSpPr>
         <p:spPr>
           <a:xfrm>
-            <a:off x="6965742" y="2071107"/>
-            <a:ext cx="4773677" cy="3797985"/>
+            <a:off x="5943600" y="4169126"/>
+            <a:ext cx="5967236" cy="2069747"/>
           </a:xfrm>
           <a:prstGeom prst="rect">
             <a:avLst/>
           </a:prstGeom>
         </p:spPr>
-      </p:pic>
+        <p:txBody>
+          <a:bodyPr/>
+          <a:lstStyle>
+            <a:lvl1pPr marL="91440" indent="-91440" algn="l" defTabSz="914400" rtl="0" eaLnBrk="1" latinLnBrk="0" hangingPunct="1">
+              <a:lnSpc>
+                <a:spcPct val="110000"/>
+              </a:lnSpc>
+              <a:spcBef>
+                <a:spcPts val="1200"/>
+              </a:spcBef>
+              <a:spcAft>
+                <a:spcPts val="200"/>
+              </a:spcAft>
+              <a:buClr>
+                <a:schemeClr val="accent1"/>
+              </a:buClr>
+              <a:buSzPct val="100000"/>
+              <a:buFont typeface="Calibri" panose="020F0502020204030204" pitchFamily="34" charset="0"/>
+              <a:buChar char=" "/>
+              <a:defRPr sz="1900" kern="1200">
+                <a:solidFill>
+                  <a:schemeClr val="tx1">
+                    <a:lumMod val="75000"/>
+                    <a:lumOff val="25000"/>
+                  </a:schemeClr>
+                </a:solidFill>
+                <a:latin typeface="+mn-lt"/>
+                <a:ea typeface="+mn-ea"/>
+                <a:cs typeface="+mn-cs"/>
+              </a:defRPr>
+            </a:lvl1pPr>
+            <a:lvl2pPr marL="384048" indent="-182880" algn="l" defTabSz="914400" rtl="0" eaLnBrk="1" latinLnBrk="0" hangingPunct="1">
+              <a:lnSpc>
+                <a:spcPct val="100000"/>
+              </a:lnSpc>
+              <a:spcBef>
+                <a:spcPts val="200"/>
+              </a:spcBef>
+              <a:spcAft>
+                <a:spcPts val="400"/>
+              </a:spcAft>
+              <a:buClrTx/>
+              <a:buFont typeface="Calibri" pitchFamily="34" charset="0"/>
+              <a:buChar char="◦"/>
+              <a:defRPr sz="1700" kern="1200">
+                <a:solidFill>
+                  <a:schemeClr val="tx1">
+                    <a:lumMod val="75000"/>
+                    <a:lumOff val="25000"/>
+                  </a:schemeClr>
+                </a:solidFill>
+                <a:latin typeface="+mn-lt"/>
+                <a:ea typeface="+mn-ea"/>
+                <a:cs typeface="+mn-cs"/>
+              </a:defRPr>
+            </a:lvl2pPr>
+            <a:lvl3pPr marL="566928" indent="-182880" algn="l" defTabSz="914400" rtl="0" eaLnBrk="1" latinLnBrk="0" hangingPunct="1">
+              <a:lnSpc>
+                <a:spcPct val="100000"/>
+              </a:lnSpc>
+              <a:spcBef>
+                <a:spcPts val="200"/>
+              </a:spcBef>
+              <a:spcAft>
+                <a:spcPts val="400"/>
+              </a:spcAft>
+              <a:buClrTx/>
+              <a:buFont typeface="Calibri" pitchFamily="34" charset="0"/>
+              <a:buChar char="◦"/>
+              <a:defRPr sz="1300" kern="1200">
+                <a:solidFill>
+                  <a:schemeClr val="tx1">
+                    <a:lumMod val="75000"/>
+                    <a:lumOff val="25000"/>
+                  </a:schemeClr>
+                </a:solidFill>
+                <a:latin typeface="+mn-lt"/>
+                <a:ea typeface="+mn-ea"/>
+                <a:cs typeface="+mn-cs"/>
+              </a:defRPr>
+            </a:lvl3pPr>
+            <a:lvl4pPr marL="749808" indent="-182880" algn="l" defTabSz="914400" rtl="0" eaLnBrk="1" latinLnBrk="0" hangingPunct="1">
+              <a:lnSpc>
+                <a:spcPct val="100000"/>
+              </a:lnSpc>
+              <a:spcBef>
+                <a:spcPts val="200"/>
+              </a:spcBef>
+              <a:spcAft>
+                <a:spcPts val="400"/>
+              </a:spcAft>
+              <a:buClrTx/>
+              <a:buFont typeface="Calibri" pitchFamily="34" charset="0"/>
+              <a:buChar char="◦"/>
+              <a:defRPr sz="1300" kern="1200">
+                <a:solidFill>
+                  <a:schemeClr val="tx1">
+                    <a:lumMod val="75000"/>
+                    <a:lumOff val="25000"/>
+                  </a:schemeClr>
+                </a:solidFill>
+                <a:latin typeface="+mn-lt"/>
+                <a:ea typeface="+mn-ea"/>
+                <a:cs typeface="+mn-cs"/>
+              </a:defRPr>
+            </a:lvl4pPr>
+            <a:lvl5pPr marL="932688" indent="-182880" algn="l" defTabSz="914400" rtl="0" eaLnBrk="1" latinLnBrk="0" hangingPunct="1">
+              <a:lnSpc>
+                <a:spcPct val="100000"/>
+              </a:lnSpc>
+              <a:spcBef>
+                <a:spcPts val="200"/>
+              </a:spcBef>
+              <a:spcAft>
+                <a:spcPts val="400"/>
+              </a:spcAft>
+              <a:buClrTx/>
+              <a:buFont typeface="Calibri" pitchFamily="34" charset="0"/>
+              <a:buChar char="◦"/>
+              <a:defRPr sz="1300" kern="1200">
+                <a:solidFill>
+                  <a:schemeClr val="tx1">
+                    <a:lumMod val="75000"/>
+                    <a:lumOff val="25000"/>
+                  </a:schemeClr>
+                </a:solidFill>
+                <a:latin typeface="+mn-lt"/>
+                <a:ea typeface="+mn-ea"/>
+                <a:cs typeface="+mn-cs"/>
+              </a:defRPr>
+            </a:lvl5pPr>
+            <a:lvl6pPr marL="1100000" indent="-228600" algn="l" defTabSz="914400" rtl="0" eaLnBrk="1" latinLnBrk="0" hangingPunct="1">
+              <a:lnSpc>
+                <a:spcPct val="90000"/>
+              </a:lnSpc>
+              <a:spcBef>
+                <a:spcPts val="200"/>
+              </a:spcBef>
+              <a:spcAft>
+                <a:spcPts val="400"/>
+              </a:spcAft>
+              <a:buClr>
+                <a:schemeClr val="accent1"/>
+              </a:buClr>
+              <a:buFont typeface="Calibri" pitchFamily="34" charset="0"/>
+              <a:buChar char="◦"/>
+              <a:defRPr sz="1400" kern="1200">
+                <a:solidFill>
+                  <a:schemeClr val="tx1">
+                    <a:lumMod val="75000"/>
+                    <a:lumOff val="25000"/>
+                  </a:schemeClr>
+                </a:solidFill>
+                <a:latin typeface="+mn-lt"/>
+                <a:ea typeface="+mn-ea"/>
+                <a:cs typeface="+mn-cs"/>
+              </a:defRPr>
+            </a:lvl6pPr>
+            <a:lvl7pPr marL="1300000" indent="-228600" algn="l" defTabSz="914400" rtl="0" eaLnBrk="1" latinLnBrk="0" hangingPunct="1">
+              <a:lnSpc>
+                <a:spcPct val="90000"/>
+              </a:lnSpc>
+              <a:spcBef>
+                <a:spcPts val="200"/>
+              </a:spcBef>
+              <a:spcAft>
+                <a:spcPts val="400"/>
+              </a:spcAft>
+              <a:buClr>
+                <a:schemeClr val="accent1"/>
+              </a:buClr>
+              <a:buFont typeface="Calibri" pitchFamily="34" charset="0"/>
+              <a:buChar char="◦"/>
+              <a:defRPr sz="1400" kern="1200">
+                <a:solidFill>
+                  <a:schemeClr val="tx1">
+                    <a:lumMod val="75000"/>
+                    <a:lumOff val="25000"/>
+                  </a:schemeClr>
+                </a:solidFill>
+                <a:latin typeface="+mn-lt"/>
+                <a:ea typeface="+mn-ea"/>
+                <a:cs typeface="+mn-cs"/>
+              </a:defRPr>
+            </a:lvl7pPr>
+            <a:lvl8pPr marL="1500000" indent="-228600" algn="l" defTabSz="914400" rtl="0" eaLnBrk="1" latinLnBrk="0" hangingPunct="1">
+              <a:lnSpc>
+                <a:spcPct val="90000"/>
+              </a:lnSpc>
+              <a:spcBef>
+                <a:spcPts val="200"/>
+              </a:spcBef>
+              <a:spcAft>
+                <a:spcPts val="400"/>
+              </a:spcAft>
+              <a:buClr>
+                <a:schemeClr val="accent1"/>
+              </a:buClr>
+              <a:buFont typeface="Calibri" pitchFamily="34" charset="0"/>
+              <a:buChar char="◦"/>
+              <a:defRPr sz="1400" kern="1200">
+                <a:solidFill>
+                  <a:schemeClr val="tx1">
+                    <a:lumMod val="75000"/>
+                    <a:lumOff val="25000"/>
+                  </a:schemeClr>
+                </a:solidFill>
+                <a:latin typeface="+mn-lt"/>
+                <a:ea typeface="+mn-ea"/>
+                <a:cs typeface="+mn-cs"/>
+              </a:defRPr>
+            </a:lvl8pPr>
+            <a:lvl9pPr marL="1700000" indent="-228600" algn="l" defTabSz="914400" rtl="0" eaLnBrk="1" latinLnBrk="0" hangingPunct="1">
+              <a:lnSpc>
+                <a:spcPct val="90000"/>
+              </a:lnSpc>
+              <a:spcBef>
+                <a:spcPts val="200"/>
+              </a:spcBef>
+              <a:spcAft>
+                <a:spcPts val="400"/>
+              </a:spcAft>
+              <a:buClr>
+                <a:schemeClr val="accent1"/>
+              </a:buClr>
+              <a:buFont typeface="Calibri" pitchFamily="34" charset="0"/>
+              <a:buChar char="◦"/>
+              <a:defRPr sz="1400" kern="1200">
+                <a:solidFill>
+                  <a:schemeClr val="tx1">
+                    <a:lumMod val="75000"/>
+                    <a:lumOff val="25000"/>
+                  </a:schemeClr>
+                </a:solidFill>
+                <a:latin typeface="+mn-lt"/>
+                <a:ea typeface="+mn-ea"/>
+                <a:cs typeface="+mn-cs"/>
+              </a:defRPr>
+            </a:lvl9pPr>
+          </a:lstStyle>
+          <a:p>
+            <a:pPr>
+              <a:buFont typeface="Wingdings" panose="05000000000000000000" pitchFamily="2" charset="2"/>
+              <a:buChar char="§"/>
+            </a:pPr>
+            <a:r>
+              <a:rPr lang="en-GB" dirty="0"/>
+              <a:t> The data cluster in 4 groups</a:t>
+            </a:r>
+          </a:p>
+          <a:p>
+            <a:pPr lvl="1">
+              <a:buFont typeface="Wingdings" panose="05000000000000000000" pitchFamily="2" charset="2"/>
+              <a:buChar char="§"/>
+            </a:pPr>
+            <a:r>
+              <a:rPr lang="en-GB" sz="1600" b="1" dirty="0">
+                <a:solidFill>
+                  <a:srgbClr val="33A02C"/>
+                </a:solidFill>
+              </a:rPr>
+              <a:t>Cluster #1:</a:t>
+            </a:r>
+            <a:r>
+              <a:rPr lang="en-GB" sz="1600" dirty="0"/>
+              <a:t> Higher productivity economies of smaller EU countries and Scandinavia</a:t>
+            </a:r>
+          </a:p>
+          <a:p>
+            <a:pPr lvl="1">
+              <a:buFont typeface="Wingdings" panose="05000000000000000000" pitchFamily="2" charset="2"/>
+              <a:buChar char="§"/>
+            </a:pPr>
+            <a:r>
+              <a:rPr lang="en-GB" sz="1600" b="1" dirty="0">
+                <a:solidFill>
+                  <a:srgbClr val="D95F02"/>
+                </a:solidFill>
+              </a:rPr>
+              <a:t>Cluster #2:</a:t>
+            </a:r>
+            <a:r>
+              <a:rPr lang="en-GB" sz="1600" dirty="0"/>
+              <a:t> Mid-range to low productivity EU economies </a:t>
+            </a:r>
+          </a:p>
+          <a:p>
+            <a:pPr lvl="1">
+              <a:buFont typeface="Wingdings" panose="05000000000000000000" pitchFamily="2" charset="2"/>
+              <a:buChar char="§"/>
+            </a:pPr>
+            <a:r>
+              <a:rPr lang="en-GB" sz="1600" b="1" dirty="0">
+                <a:solidFill>
+                  <a:srgbClr val="7570B3"/>
+                </a:solidFill>
+              </a:rPr>
+              <a:t>Cluster #3:</a:t>
+            </a:r>
+            <a:r>
+              <a:rPr lang="en-GB" sz="1600" dirty="0">
+                <a:solidFill>
+                  <a:srgbClr val="7570B3"/>
+                </a:solidFill>
+              </a:rPr>
+              <a:t> </a:t>
+            </a:r>
+            <a:r>
+              <a:rPr lang="en-GB" sz="1600" dirty="0"/>
+              <a:t>Italy, Spain and the UK (mid-range productivity)</a:t>
+            </a:r>
+          </a:p>
+          <a:p>
+            <a:pPr lvl="1">
+              <a:buFont typeface="Wingdings" panose="05000000000000000000" pitchFamily="2" charset="2"/>
+              <a:buChar char="§"/>
+            </a:pPr>
+            <a:r>
+              <a:rPr lang="en-GB" sz="1600" b="1" dirty="0">
+                <a:solidFill>
+                  <a:srgbClr val="E7298A"/>
+                </a:solidFill>
+              </a:rPr>
+              <a:t>Cluster #4:</a:t>
+            </a:r>
+            <a:r>
+              <a:rPr lang="en-GB" sz="1600" dirty="0"/>
+              <a:t> France and Germany (advanced productivity)</a:t>
+            </a:r>
+          </a:p>
+        </p:txBody>
+      </p:sp>
     </p:spTree>
     <p:extLst>
       <p:ext uri="{BB962C8B-B14F-4D97-AF65-F5344CB8AC3E}">
-        <p14:creationId xmlns:p14="http://schemas.microsoft.com/office/powerpoint/2010/main" val="1114119021"/>
+        <p14:creationId xmlns:p14="http://schemas.microsoft.com/office/powerpoint/2010/main" val="3383321252"/>
       </p:ext>
     </p:extLst>
   </p:cSld>
@@ -6333,160 +7483,467 @@
       </p:sp>
       <p:sp>
         <p:nvSpPr>
-          <p:cNvPr id="4" name="TextBox 3">
+          <p:cNvPr id="7" name="Content Placeholder 2">
             <a:extLst>
               <a:ext uri="{FF2B5EF4-FFF2-40B4-BE49-F238E27FC236}">
-                <a16:creationId xmlns:a16="http://schemas.microsoft.com/office/drawing/2014/main" id="{75E2D7CD-DE6E-CDFA-491E-AA0FF9688048}"/>
+                <a16:creationId xmlns:a16="http://schemas.microsoft.com/office/drawing/2014/main" id="{973B8575-F29F-3B50-72B5-949FA7B34D1D}"/>
               </a:ext>
             </a:extLst>
           </p:cNvPr>
-          <p:cNvSpPr txBox="1"/>
+          <p:cNvSpPr txBox="1">
+            <a:spLocks/>
+          </p:cNvSpPr>
           <p:nvPr/>
         </p:nvSpPr>
         <p:spPr>
           <a:xfrm>
-            <a:off x="1609178" y="1994253"/>
-            <a:ext cx="8985013" cy="1785104"/>
+            <a:off x="1097281" y="2108201"/>
+            <a:ext cx="6217920" cy="3760891"/>
           </a:xfrm>
           <a:prstGeom prst="rect">
             <a:avLst/>
           </a:prstGeom>
-          <a:noFill/>
         </p:spPr>
         <p:txBody>
-          <a:bodyPr wrap="square" lIns="0" tIns="0" rIns="0" bIns="0" rtlCol="0">
-            <a:spAutoFit/>
-          </a:bodyPr>
-          <a:lstStyle/>
-          <a:p>
+          <a:bodyPr/>
+          <a:lstStyle>
+            <a:lvl1pPr marL="91440" indent="-91440" algn="l" defTabSz="914400" rtl="0" eaLnBrk="1" latinLnBrk="0" hangingPunct="1">
+              <a:lnSpc>
+                <a:spcPct val="110000"/>
+              </a:lnSpc>
+              <a:spcBef>
+                <a:spcPts val="1200"/>
+              </a:spcBef>
+              <a:spcAft>
+                <a:spcPts val="200"/>
+              </a:spcAft>
+              <a:buClr>
+                <a:schemeClr val="accent1"/>
+              </a:buClr>
+              <a:buSzPct val="100000"/>
+              <a:buFont typeface="Calibri" panose="020F0502020204030204" pitchFamily="34" charset="0"/>
+              <a:buChar char=" "/>
+              <a:defRPr sz="1900" kern="1200">
+                <a:solidFill>
+                  <a:schemeClr val="tx1">
+                    <a:lumMod val="75000"/>
+                    <a:lumOff val="25000"/>
+                  </a:schemeClr>
+                </a:solidFill>
+                <a:latin typeface="+mn-lt"/>
+                <a:ea typeface="+mn-ea"/>
+                <a:cs typeface="+mn-cs"/>
+              </a:defRPr>
+            </a:lvl1pPr>
+            <a:lvl2pPr marL="384048" indent="-182880" algn="l" defTabSz="914400" rtl="0" eaLnBrk="1" latinLnBrk="0" hangingPunct="1">
+              <a:lnSpc>
+                <a:spcPct val="100000"/>
+              </a:lnSpc>
+              <a:spcBef>
+                <a:spcPts val="200"/>
+              </a:spcBef>
+              <a:spcAft>
+                <a:spcPts val="400"/>
+              </a:spcAft>
+              <a:buClrTx/>
+              <a:buFont typeface="Calibri" pitchFamily="34" charset="0"/>
+              <a:buChar char="◦"/>
+              <a:defRPr sz="1700" kern="1200">
+                <a:solidFill>
+                  <a:schemeClr val="tx1">
+                    <a:lumMod val="75000"/>
+                    <a:lumOff val="25000"/>
+                  </a:schemeClr>
+                </a:solidFill>
+                <a:latin typeface="+mn-lt"/>
+                <a:ea typeface="+mn-ea"/>
+                <a:cs typeface="+mn-cs"/>
+              </a:defRPr>
+            </a:lvl2pPr>
+            <a:lvl3pPr marL="566928" indent="-182880" algn="l" defTabSz="914400" rtl="0" eaLnBrk="1" latinLnBrk="0" hangingPunct="1">
+              <a:lnSpc>
+                <a:spcPct val="100000"/>
+              </a:lnSpc>
+              <a:spcBef>
+                <a:spcPts val="200"/>
+              </a:spcBef>
+              <a:spcAft>
+                <a:spcPts val="400"/>
+              </a:spcAft>
+              <a:buClrTx/>
+              <a:buFont typeface="Calibri" pitchFamily="34" charset="0"/>
+              <a:buChar char="◦"/>
+              <a:defRPr sz="1300" kern="1200">
+                <a:solidFill>
+                  <a:schemeClr val="tx1">
+                    <a:lumMod val="75000"/>
+                    <a:lumOff val="25000"/>
+                  </a:schemeClr>
+                </a:solidFill>
+                <a:latin typeface="+mn-lt"/>
+                <a:ea typeface="+mn-ea"/>
+                <a:cs typeface="+mn-cs"/>
+              </a:defRPr>
+            </a:lvl3pPr>
+            <a:lvl4pPr marL="749808" indent="-182880" algn="l" defTabSz="914400" rtl="0" eaLnBrk="1" latinLnBrk="0" hangingPunct="1">
+              <a:lnSpc>
+                <a:spcPct val="100000"/>
+              </a:lnSpc>
+              <a:spcBef>
+                <a:spcPts val="200"/>
+              </a:spcBef>
+              <a:spcAft>
+                <a:spcPts val="400"/>
+              </a:spcAft>
+              <a:buClrTx/>
+              <a:buFont typeface="Calibri" pitchFamily="34" charset="0"/>
+              <a:buChar char="◦"/>
+              <a:defRPr sz="1300" kern="1200">
+                <a:solidFill>
+                  <a:schemeClr val="tx1">
+                    <a:lumMod val="75000"/>
+                    <a:lumOff val="25000"/>
+                  </a:schemeClr>
+                </a:solidFill>
+                <a:latin typeface="+mn-lt"/>
+                <a:ea typeface="+mn-ea"/>
+                <a:cs typeface="+mn-cs"/>
+              </a:defRPr>
+            </a:lvl4pPr>
+            <a:lvl5pPr marL="932688" indent="-182880" algn="l" defTabSz="914400" rtl="0" eaLnBrk="1" latinLnBrk="0" hangingPunct="1">
+              <a:lnSpc>
+                <a:spcPct val="100000"/>
+              </a:lnSpc>
+              <a:spcBef>
+                <a:spcPts val="200"/>
+              </a:spcBef>
+              <a:spcAft>
+                <a:spcPts val="400"/>
+              </a:spcAft>
+              <a:buClrTx/>
+              <a:buFont typeface="Calibri" pitchFamily="34" charset="0"/>
+              <a:buChar char="◦"/>
+              <a:defRPr sz="1300" kern="1200">
+                <a:solidFill>
+                  <a:schemeClr val="tx1">
+                    <a:lumMod val="75000"/>
+                    <a:lumOff val="25000"/>
+                  </a:schemeClr>
+                </a:solidFill>
+                <a:latin typeface="+mn-lt"/>
+                <a:ea typeface="+mn-ea"/>
+                <a:cs typeface="+mn-cs"/>
+              </a:defRPr>
+            </a:lvl5pPr>
+            <a:lvl6pPr marL="1100000" indent="-228600" algn="l" defTabSz="914400" rtl="0" eaLnBrk="1" latinLnBrk="0" hangingPunct="1">
+              <a:lnSpc>
+                <a:spcPct val="90000"/>
+              </a:lnSpc>
+              <a:spcBef>
+                <a:spcPts val="200"/>
+              </a:spcBef>
+              <a:spcAft>
+                <a:spcPts val="400"/>
+              </a:spcAft>
+              <a:buClr>
+                <a:schemeClr val="accent1"/>
+              </a:buClr>
+              <a:buFont typeface="Calibri" pitchFamily="34" charset="0"/>
+              <a:buChar char="◦"/>
+              <a:defRPr sz="1400" kern="1200">
+                <a:solidFill>
+                  <a:schemeClr val="tx1">
+                    <a:lumMod val="75000"/>
+                    <a:lumOff val="25000"/>
+                  </a:schemeClr>
+                </a:solidFill>
+                <a:latin typeface="+mn-lt"/>
+                <a:ea typeface="+mn-ea"/>
+                <a:cs typeface="+mn-cs"/>
+              </a:defRPr>
+            </a:lvl6pPr>
+            <a:lvl7pPr marL="1300000" indent="-228600" algn="l" defTabSz="914400" rtl="0" eaLnBrk="1" latinLnBrk="0" hangingPunct="1">
+              <a:lnSpc>
+                <a:spcPct val="90000"/>
+              </a:lnSpc>
+              <a:spcBef>
+                <a:spcPts val="200"/>
+              </a:spcBef>
+              <a:spcAft>
+                <a:spcPts val="400"/>
+              </a:spcAft>
+              <a:buClr>
+                <a:schemeClr val="accent1"/>
+              </a:buClr>
+              <a:buFont typeface="Calibri" pitchFamily="34" charset="0"/>
+              <a:buChar char="◦"/>
+              <a:defRPr sz="1400" kern="1200">
+                <a:solidFill>
+                  <a:schemeClr val="tx1">
+                    <a:lumMod val="75000"/>
+                    <a:lumOff val="25000"/>
+                  </a:schemeClr>
+                </a:solidFill>
+                <a:latin typeface="+mn-lt"/>
+                <a:ea typeface="+mn-ea"/>
+                <a:cs typeface="+mn-cs"/>
+              </a:defRPr>
+            </a:lvl7pPr>
+            <a:lvl8pPr marL="1500000" indent="-228600" algn="l" defTabSz="914400" rtl="0" eaLnBrk="1" latinLnBrk="0" hangingPunct="1">
+              <a:lnSpc>
+                <a:spcPct val="90000"/>
+              </a:lnSpc>
+              <a:spcBef>
+                <a:spcPts val="200"/>
+              </a:spcBef>
+              <a:spcAft>
+                <a:spcPts val="400"/>
+              </a:spcAft>
+              <a:buClr>
+                <a:schemeClr val="accent1"/>
+              </a:buClr>
+              <a:buFont typeface="Calibri" pitchFamily="34" charset="0"/>
+              <a:buChar char="◦"/>
+              <a:defRPr sz="1400" kern="1200">
+                <a:solidFill>
+                  <a:schemeClr val="tx1">
+                    <a:lumMod val="75000"/>
+                    <a:lumOff val="25000"/>
+                  </a:schemeClr>
+                </a:solidFill>
+                <a:latin typeface="+mn-lt"/>
+                <a:ea typeface="+mn-ea"/>
+                <a:cs typeface="+mn-cs"/>
+              </a:defRPr>
+            </a:lvl8pPr>
+            <a:lvl9pPr marL="1700000" indent="-228600" algn="l" defTabSz="914400" rtl="0" eaLnBrk="1" latinLnBrk="0" hangingPunct="1">
+              <a:lnSpc>
+                <a:spcPct val="90000"/>
+              </a:lnSpc>
+              <a:spcBef>
+                <a:spcPts val="200"/>
+              </a:spcBef>
+              <a:spcAft>
+                <a:spcPts val="400"/>
+              </a:spcAft>
+              <a:buClr>
+                <a:schemeClr val="accent1"/>
+              </a:buClr>
+              <a:buFont typeface="Calibri" pitchFamily="34" charset="0"/>
+              <a:buChar char="◦"/>
+              <a:defRPr sz="1400" kern="1200">
+                <a:solidFill>
+                  <a:schemeClr val="tx1">
+                    <a:lumMod val="75000"/>
+                    <a:lumOff val="25000"/>
+                  </a:schemeClr>
+                </a:solidFill>
+                <a:latin typeface="+mn-lt"/>
+                <a:ea typeface="+mn-ea"/>
+                <a:cs typeface="+mn-cs"/>
+              </a:defRPr>
+            </a:lvl9pPr>
+          </a:lstStyle>
+          <a:p>
+            <a:pPr>
+              <a:buFont typeface="Wingdings" panose="05000000000000000000" pitchFamily="2" charset="2"/>
+              <a:buChar char="§"/>
+            </a:pPr>
             <a:r>
               <a:rPr lang="en-GB" dirty="0"/>
-              <a:t>Linear Regression model:</a:t>
-            </a:r>
-          </a:p>
-          <a:p>
+              <a:t> Data from years 1995-2020 were used</a:t>
+            </a:r>
+          </a:p>
+          <a:p>
+            <a:pPr>
+              <a:buFont typeface="Wingdings" panose="05000000000000000000" pitchFamily="2" charset="2"/>
+              <a:buChar char="§"/>
+            </a:pPr>
             <a:r>
               <a:rPr lang="en-GB" dirty="0"/>
-              <a:t>(</a:t>
-            </a:r>
-            <a:r>
-              <a:rPr lang="en-GB" sz="1600" dirty="0"/>
-              <a:t>GDP per hour worked $) = 26.96 </a:t>
-            </a:r>
-          </a:p>
-          <a:p>
-            <a:r>
-              <a:rPr lang="en-GB" sz="1600" dirty="0"/>
-              <a:t>			+ 0.1682</a:t>
-            </a:r>
-            <a:r>
-              <a:rPr lang="en-GB" sz="1600" baseline="-25000" dirty="0"/>
-              <a:t> </a:t>
-            </a:r>
-            <a:r>
-              <a:rPr lang="en-GB" sz="1600" dirty="0">
-                <a:sym typeface="Symbol" panose="05050102010706020507" pitchFamily="18" charset="2"/>
+              <a:t> Factors used to predict productivity</a:t>
+            </a:r>
+          </a:p>
+          <a:p>
+            <a:pPr lvl="4">
+              <a:buFont typeface="Wingdings" panose="05000000000000000000" pitchFamily="2" charset="2"/>
+              <a:buChar char="§"/>
+            </a:pPr>
+            <a:r>
+              <a:rPr lang="en-GB" sz="1400" b="1" dirty="0">
+                <a:solidFill>
+                  <a:srgbClr val="7570B3"/>
+                </a:solidFill>
               </a:rPr>
-              <a:t> </a:t>
-            </a:r>
-            <a:r>
-              <a:rPr lang="en-GB" sz="1600" dirty="0"/>
-              <a:t>(Infrastructures $billion)</a:t>
-            </a:r>
-          </a:p>
-          <a:p>
-            <a:r>
-              <a:rPr lang="en-GB" sz="1600" dirty="0"/>
-              <a:t>			+ 0.1717</a:t>
-            </a:r>
-            <a:r>
-              <a:rPr lang="en-GB" sz="1600" dirty="0">
-                <a:sym typeface="Symbol" panose="05050102010706020507" pitchFamily="18" charset="2"/>
-              </a:rPr>
-              <a:t>  </a:t>
-            </a:r>
-            <a:r>
-              <a:rPr lang="en-GB" sz="1600" dirty="0"/>
-              <a:t>(Intellectual Property $billion)  </a:t>
-            </a:r>
-          </a:p>
-          <a:p>
-            <a:r>
-              <a:rPr lang="en-GB" sz="1600" dirty="0"/>
-              <a:t>			+ 0.2123</a:t>
-            </a:r>
-            <a:r>
-              <a:rPr lang="en-GB" sz="1600" dirty="0">
-                <a:sym typeface="Symbol" panose="05050102010706020507" pitchFamily="18" charset="2"/>
-              </a:rPr>
-              <a:t>  </a:t>
-            </a:r>
-            <a:r>
-              <a:rPr lang="en-GB" sz="1600" dirty="0"/>
-              <a:t>(Dwellings $billion)</a:t>
-            </a:r>
-          </a:p>
-          <a:p>
-            <a:r>
-              <a:rPr lang="en-GB" sz="1600" dirty="0"/>
-              <a:t>			-  0.01543</a:t>
-            </a:r>
-            <a:r>
-              <a:rPr lang="en-GB" sz="1600" dirty="0">
-                <a:sym typeface="Symbol" panose="05050102010706020507" pitchFamily="18" charset="2"/>
-              </a:rPr>
-              <a:t>  </a:t>
-            </a:r>
-            <a:r>
-              <a:rPr lang="en-GB" sz="1600" dirty="0"/>
-              <a:t>(Infrastructures</a:t>
-            </a:r>
-            <a:r>
-              <a:rPr lang="en-GB" sz="1600" dirty="0">
-                <a:sym typeface="Symbol" panose="05050102010706020507" pitchFamily="18" charset="2"/>
+              <a:t>Intellectual Property</a:t>
+            </a:r>
+            <a:r>
+              <a:rPr lang="en-GB" sz="1400" dirty="0">
+                <a:solidFill>
+                  <a:srgbClr val="7570B3"/>
+                </a:solidFill>
               </a:rPr>
               <a:t> </a:t>
             </a:r>
             <a:r>
-              <a:rPr lang="en-GB" sz="1600" dirty="0"/>
-              <a:t>$billion </a:t>
-            </a:r>
-            <a:r>
-              <a:rPr lang="en-GB" sz="1600" dirty="0">
-                <a:sym typeface="Symbol" panose="05050102010706020507" pitchFamily="18" charset="2"/>
+              <a:rPr lang="en-GB" sz="1400" dirty="0"/>
+              <a:t>(R&amp;D, software &amp; databases, literary and artistic originals, etc)</a:t>
+            </a:r>
+          </a:p>
+          <a:p>
+            <a:pPr lvl="4">
+              <a:buFont typeface="Wingdings" panose="05000000000000000000" pitchFamily="2" charset="2"/>
+              <a:buChar char="§"/>
+            </a:pPr>
+            <a:r>
+              <a:rPr lang="en-GB" sz="1400" b="1" dirty="0">
+                <a:solidFill>
+                  <a:srgbClr val="D95F02"/>
+                </a:solidFill>
               </a:rPr>
-              <a:t> </a:t>
-            </a:r>
-            <a:r>
-              <a:rPr lang="en-GB" sz="1600" dirty="0"/>
-              <a:t>Cultivated bio resources $billion)</a:t>
-            </a:r>
-          </a:p>
-          <a:p>
-            <a:r>
-              <a:rPr lang="en-GB" sz="1600" dirty="0"/>
-              <a:t>			-  0.001436</a:t>
-            </a:r>
-            <a:r>
-              <a:rPr lang="en-GB" sz="1600" dirty="0">
-                <a:sym typeface="Symbol" panose="05050102010706020507" pitchFamily="18" charset="2"/>
+              <a:t>Dwellings</a:t>
+            </a:r>
+            <a:r>
+              <a:rPr lang="en-GB" sz="1400" dirty="0"/>
+              <a:t> (excluding land)</a:t>
+            </a:r>
+          </a:p>
+          <a:p>
+            <a:pPr lvl="4">
+              <a:buFont typeface="Wingdings" panose="05000000000000000000" pitchFamily="2" charset="2"/>
+              <a:buChar char="§"/>
+            </a:pPr>
+            <a:r>
+              <a:rPr lang="en-GB" sz="1400" b="1" dirty="0">
+                <a:solidFill>
+                  <a:srgbClr val="33A02C"/>
+                </a:solidFill>
               </a:rPr>
-              <a:t>  </a:t>
-            </a:r>
-            <a:r>
-              <a:rPr lang="en-GB" sz="1600" dirty="0"/>
-              <a:t>(Infrastructures $billion</a:t>
-            </a:r>
-            <a:r>
-              <a:rPr lang="en-GB" sz="1600" dirty="0">
-                <a:sym typeface="Symbol" panose="05050102010706020507" pitchFamily="18" charset="2"/>
+              <a:t>Cultivated biological resources </a:t>
+            </a:r>
+            <a:r>
+              <a:rPr lang="en-GB" sz="1400" dirty="0"/>
+              <a:t>(managed forests, livestock raised for milk production, etc.)</a:t>
+            </a:r>
+          </a:p>
+          <a:p>
+            <a:pPr lvl="4">
+              <a:buFont typeface="Wingdings" panose="05000000000000000000" pitchFamily="2" charset="2"/>
+              <a:buChar char="§"/>
+            </a:pPr>
+            <a:r>
+              <a:rPr lang="en-GB" sz="1400" b="1" dirty="0">
+                <a:solidFill>
+                  <a:srgbClr val="E7298A"/>
+                </a:solidFill>
               </a:rPr>
-              <a:t>  </a:t>
-            </a:r>
-            <a:r>
-              <a:rPr lang="en-GB" sz="1600" dirty="0"/>
-              <a:t>Dwellings $billion)</a:t>
-            </a:r>
+              <a:t>Infrastructures</a:t>
+            </a:r>
+            <a:r>
+              <a:rPr lang="en-GB" sz="1400" dirty="0"/>
+              <a:t> (roads, bridges, airfields, dams, etc.)</a:t>
+            </a:r>
+          </a:p>
+          <a:p>
+            <a:pPr lvl="4">
+              <a:buFont typeface="Wingdings" panose="05000000000000000000" pitchFamily="2" charset="2"/>
+              <a:buChar char="§"/>
+            </a:pPr>
+            <a:r>
+              <a:rPr lang="en-GB" sz="1400" b="1" dirty="0">
+                <a:solidFill>
+                  <a:srgbClr val="E6AB02"/>
+                </a:solidFill>
+              </a:rPr>
+              <a:t>Transportation equipment</a:t>
+            </a:r>
+            <a:r>
+              <a:rPr lang="en-GB" sz="1400" dirty="0"/>
+              <a:t> (ships, trains, aircraft, etc.)</a:t>
+            </a:r>
+          </a:p>
+          <a:p>
+            <a:pPr lvl="4">
+              <a:buFont typeface="Wingdings" panose="05000000000000000000" pitchFamily="2" charset="2"/>
+              <a:buChar char="§"/>
+            </a:pPr>
+            <a:r>
+              <a:rPr lang="en-GB" sz="1400" b="1" dirty="0">
+                <a:solidFill>
+                  <a:srgbClr val="66A61E"/>
+                </a:solidFill>
+              </a:rPr>
+              <a:t>Information and Communication Tech </a:t>
+            </a:r>
+            <a:r>
+              <a:rPr lang="en-GB" sz="1400" dirty="0"/>
+              <a:t>(software, hardware, databases, telecoms equipment, etc.)</a:t>
+            </a:r>
+          </a:p>
+          <a:p>
+            <a:pPr>
+              <a:buFont typeface="Wingdings" panose="05000000000000000000" pitchFamily="2" charset="2"/>
+              <a:buChar char="§"/>
+            </a:pPr>
+            <a:r>
+              <a:rPr lang="en-GB" dirty="0"/>
+              <a:t> Education and mental health data were too scarce to use for modelling</a:t>
+            </a:r>
+          </a:p>
+          <a:p>
+            <a:pPr marL="201168" lvl="1" indent="0">
+              <a:buNone/>
+            </a:pPr>
+            <a:endParaRPr lang="en-GB" sz="1800" dirty="0">
+              <a:solidFill>
+                <a:srgbClr val="66A61E"/>
+              </a:solidFill>
+            </a:endParaRPr>
+          </a:p>
+          <a:p>
+            <a:pPr marL="201168" lvl="1" indent="0">
+              <a:buNone/>
+            </a:pPr>
+            <a:endParaRPr lang="en-GB" sz="1800" dirty="0">
+              <a:solidFill>
+                <a:srgbClr val="66A61E"/>
+              </a:solidFill>
+            </a:endParaRPr>
+          </a:p>
+          <a:p>
+            <a:pPr lvl="1">
+              <a:buFont typeface="Wingdings" panose="05000000000000000000" pitchFamily="2" charset="2"/>
+              <a:buChar char="§"/>
+            </a:pPr>
+            <a:endParaRPr lang="en-GB" sz="1800" dirty="0">
+              <a:solidFill>
+                <a:srgbClr val="66A61E"/>
+              </a:solidFill>
+            </a:endParaRPr>
+          </a:p>
+          <a:p>
+            <a:pPr marL="201168" lvl="1" indent="0">
+              <a:buNone/>
+            </a:pPr>
+            <a:endParaRPr lang="en-GB" sz="1800" dirty="0">
+              <a:solidFill>
+                <a:srgbClr val="66A61E"/>
+              </a:solidFill>
+            </a:endParaRPr>
+          </a:p>
+          <a:p>
+            <a:pPr lvl="1">
+              <a:buFont typeface="Wingdings" panose="05000000000000000000" pitchFamily="2" charset="2"/>
+              <a:buChar char="§"/>
+            </a:pPr>
+            <a:endParaRPr lang="en-GB" sz="1800" dirty="0"/>
+          </a:p>
+          <a:p>
+            <a:pPr lvl="1">
+              <a:buFont typeface="Wingdings" panose="05000000000000000000" pitchFamily="2" charset="2"/>
+              <a:buChar char="§"/>
+            </a:pPr>
+            <a:endParaRPr lang="en-GB" dirty="0"/>
           </a:p>
         </p:txBody>
       </p:sp>
@@ -6495,7 +7952,7 @@
           <p:cNvPr id="5" name="Picture 4">
             <a:extLst>
               <a:ext uri="{FF2B5EF4-FFF2-40B4-BE49-F238E27FC236}">
-                <a16:creationId xmlns:a16="http://schemas.microsoft.com/office/drawing/2014/main" id="{AFA20F59-B5D6-8707-1057-8B980304EF26}"/>
+                <a16:creationId xmlns:a16="http://schemas.microsoft.com/office/drawing/2014/main" id="{D7A01AAF-F7FB-9E28-CA64-5369C2008572}"/>
               </a:ext>
             </a:extLst>
           </p:cNvPr>
@@ -6504,309 +7961,25 @@
           </p:cNvPicPr>
           <p:nvPr/>
         </p:nvPicPr>
-        <p:blipFill>
+        <p:blipFill rotWithShape="1">
           <a:blip r:embed="rId2"/>
-          <a:stretch>
-            <a:fillRect/>
-          </a:stretch>
+          <a:srcRect r="22431"/>
+          <a:stretch/>
         </p:blipFill>
         <p:spPr>
           <a:xfrm>
-            <a:off x="196896" y="3854242"/>
-            <a:ext cx="4104070" cy="2532797"/>
+            <a:off x="7315201" y="2328282"/>
+            <a:ext cx="4773677" cy="3797985"/>
           </a:xfrm>
           <a:prstGeom prst="rect">
             <a:avLst/>
           </a:prstGeom>
         </p:spPr>
       </p:pic>
-      <p:graphicFrame>
-        <p:nvGraphicFramePr>
-          <p:cNvPr id="6" name="Table 8">
-            <a:extLst>
-              <a:ext uri="{FF2B5EF4-FFF2-40B4-BE49-F238E27FC236}">
-                <a16:creationId xmlns:a16="http://schemas.microsoft.com/office/drawing/2014/main" id="{6AF3C782-4C22-E29B-70F2-8628002C99FD}"/>
-              </a:ext>
-            </a:extLst>
-          </p:cNvPr>
-          <p:cNvGraphicFramePr>
-            <a:graphicFrameLocks noGrp="1"/>
-          </p:cNvGraphicFramePr>
-          <p:nvPr>
-            <p:extLst>
-              <p:ext uri="{D42A27DB-BD31-4B8C-83A1-F6EECF244321}">
-                <p14:modId xmlns:p14="http://schemas.microsoft.com/office/powerpoint/2010/main" val="3609206996"/>
-              </p:ext>
-            </p:extLst>
-          </p:nvPr>
-        </p:nvGraphicFramePr>
-        <p:xfrm>
-          <a:off x="10594191" y="1971255"/>
-          <a:ext cx="1267125" cy="1828800"/>
-        </p:xfrm>
-        <a:graphic>
-          <a:graphicData uri="http://schemas.openxmlformats.org/drawingml/2006/table">
-            <a:tbl>
-              <a:tblPr firstRow="1" bandRow="1">
-                <a:tableStyleId>{5C22544A-7EE6-4342-B048-85BDC9FD1C3A}</a:tableStyleId>
-              </a:tblPr>
-              <a:tblGrid>
-                <a:gridCol w="1267125">
-                  <a:extLst>
-                    <a:ext uri="{9D8B030D-6E8A-4147-A177-3AD203B41FA5}">
-                      <a16:colId xmlns:a16="http://schemas.microsoft.com/office/drawing/2014/main" val="3734979491"/>
-                    </a:ext>
-                  </a:extLst>
-                </a:gridCol>
-              </a:tblGrid>
-              <a:tr h="443168">
-                <a:tc>
-                  <a:txBody>
-                    <a:bodyPr/>
-                    <a:lstStyle/>
-                    <a:p>
-                      <a:r>
-                        <a:rPr lang="en-GB" sz="1200" dirty="0"/>
-                        <a:t>variance explained (%)</a:t>
-                      </a:r>
-                    </a:p>
-                  </a:txBody>
-                  <a:tcPr/>
-                </a:tc>
-                <a:extLst>
-                  <a:ext uri="{0D108BD9-81ED-4DB2-BD59-A6C34878D82A}">
-                    <a16:rowId xmlns:a16="http://schemas.microsoft.com/office/drawing/2014/main" val="368584855"/>
-                  </a:ext>
-                </a:extLst>
-              </a:tr>
-              <a:tr h="247116">
-                <a:tc>
-                  <a:txBody>
-                    <a:bodyPr/>
-                    <a:lstStyle/>
-                    <a:p>
-                      <a:r>
-                        <a:rPr lang="en-GB" sz="1200" dirty="0"/>
-                        <a:t>32.85</a:t>
-                      </a:r>
-                    </a:p>
-                  </a:txBody>
-                  <a:tcPr/>
-                </a:tc>
-                <a:extLst>
-                  <a:ext uri="{0D108BD9-81ED-4DB2-BD59-A6C34878D82A}">
-                    <a16:rowId xmlns:a16="http://schemas.microsoft.com/office/drawing/2014/main" val="3141812195"/>
-                  </a:ext>
-                </a:extLst>
-              </a:tr>
-              <a:tr h="247116">
-                <a:tc>
-                  <a:txBody>
-                    <a:bodyPr/>
-                    <a:lstStyle/>
-                    <a:p>
-                      <a:r>
-                        <a:rPr lang="en-GB" sz="1200" dirty="0"/>
-                        <a:t>17.27</a:t>
-                      </a:r>
-                    </a:p>
-                  </a:txBody>
-                  <a:tcPr/>
-                </a:tc>
-                <a:extLst>
-                  <a:ext uri="{0D108BD9-81ED-4DB2-BD59-A6C34878D82A}">
-                    <a16:rowId xmlns:a16="http://schemas.microsoft.com/office/drawing/2014/main" val="4155198396"/>
-                  </a:ext>
-                </a:extLst>
-              </a:tr>
-              <a:tr h="247116">
-                <a:tc>
-                  <a:txBody>
-                    <a:bodyPr/>
-                    <a:lstStyle/>
-                    <a:p>
-                      <a:r>
-                        <a:rPr lang="en-GB" sz="1200" dirty="0"/>
-                        <a:t>34.42</a:t>
-                      </a:r>
-                    </a:p>
-                  </a:txBody>
-                  <a:tcPr/>
-                </a:tc>
-                <a:extLst>
-                  <a:ext uri="{0D108BD9-81ED-4DB2-BD59-A6C34878D82A}">
-                    <a16:rowId xmlns:a16="http://schemas.microsoft.com/office/drawing/2014/main" val="2103473534"/>
-                  </a:ext>
-                </a:extLst>
-              </a:tr>
-              <a:tr h="174428">
-                <a:tc>
-                  <a:txBody>
-                    <a:bodyPr/>
-                    <a:lstStyle/>
-                    <a:p>
-                      <a:r>
-                        <a:rPr lang="en-GB" sz="1200" dirty="0"/>
-                        <a:t>   0.45</a:t>
-                      </a:r>
-                    </a:p>
-                  </a:txBody>
-                  <a:tcPr/>
-                </a:tc>
-                <a:extLst>
-                  <a:ext uri="{0D108BD9-81ED-4DB2-BD59-A6C34878D82A}">
-                    <a16:rowId xmlns:a16="http://schemas.microsoft.com/office/drawing/2014/main" val="1186503113"/>
-                  </a:ext>
-                </a:extLst>
-              </a:tr>
-              <a:tr h="247470">
-                <a:tc>
-                  <a:txBody>
-                    <a:bodyPr/>
-                    <a:lstStyle/>
-                    <a:p>
-                      <a:r>
-                        <a:rPr lang="en-GB" sz="1200" dirty="0"/>
-                        <a:t>15.01</a:t>
-                      </a:r>
-                    </a:p>
-                  </a:txBody>
-                  <a:tcPr/>
-                </a:tc>
-                <a:extLst>
-                  <a:ext uri="{0D108BD9-81ED-4DB2-BD59-A6C34878D82A}">
-                    <a16:rowId xmlns:a16="http://schemas.microsoft.com/office/drawing/2014/main" val="402570956"/>
-                  </a:ext>
-                </a:extLst>
-              </a:tr>
-            </a:tbl>
-          </a:graphicData>
-        </a:graphic>
-      </p:graphicFrame>
-      <p:graphicFrame>
-        <p:nvGraphicFramePr>
-          <p:cNvPr id="9" name="Table 9">
-            <a:extLst>
-              <a:ext uri="{FF2B5EF4-FFF2-40B4-BE49-F238E27FC236}">
-                <a16:creationId xmlns:a16="http://schemas.microsoft.com/office/drawing/2014/main" id="{AD32E437-1D04-1125-C362-E306B2E9EA56}"/>
-              </a:ext>
-            </a:extLst>
-          </p:cNvPr>
-          <p:cNvGraphicFramePr>
-            <a:graphicFrameLocks noGrp="1"/>
-          </p:cNvGraphicFramePr>
-          <p:nvPr>
-            <p:extLst>
-              <p:ext uri="{D42A27DB-BD31-4B8C-83A1-F6EECF244321}">
-                <p14:modId xmlns:p14="http://schemas.microsoft.com/office/powerpoint/2010/main" val="1546387880"/>
-              </p:ext>
-            </p:extLst>
-          </p:nvPr>
-        </p:nvGraphicFramePr>
-        <p:xfrm>
-          <a:off x="4680309" y="5322491"/>
-          <a:ext cx="2277374" cy="736600"/>
-        </p:xfrm>
-        <a:graphic>
-          <a:graphicData uri="http://schemas.openxmlformats.org/drawingml/2006/table">
-            <a:tbl>
-              <a:tblPr firstRow="1" bandRow="1">
-                <a:tableStyleId>{5C22544A-7EE6-4342-B048-85BDC9FD1C3A}</a:tableStyleId>
-              </a:tblPr>
-              <a:tblGrid>
-                <a:gridCol w="1138687">
-                  <a:extLst>
-                    <a:ext uri="{9D8B030D-6E8A-4147-A177-3AD203B41FA5}">
-                      <a16:colId xmlns:a16="http://schemas.microsoft.com/office/drawing/2014/main" val="644099366"/>
-                    </a:ext>
-                  </a:extLst>
-                </a:gridCol>
-                <a:gridCol w="1138687">
-                  <a:extLst>
-                    <a:ext uri="{9D8B030D-6E8A-4147-A177-3AD203B41FA5}">
-                      <a16:colId xmlns:a16="http://schemas.microsoft.com/office/drawing/2014/main" val="2001716684"/>
-                    </a:ext>
-                  </a:extLst>
-                </a:gridCol>
-              </a:tblGrid>
-              <a:tr h="236490">
-                <a:tc>
-                  <a:txBody>
-                    <a:bodyPr/>
-                    <a:lstStyle/>
-                    <a:p>
-                      <a:r>
-                        <a:rPr lang="en-GB" dirty="0"/>
-                        <a:t>RMSE</a:t>
-                      </a:r>
-                    </a:p>
-                  </a:txBody>
-                  <a:tcPr/>
-                </a:tc>
-                <a:tc>
-                  <a:txBody>
-                    <a:bodyPr/>
-                    <a:lstStyle/>
-                    <a:p>
-                      <a:r>
-                        <a:rPr lang="en-GB" dirty="0"/>
-                        <a:t>R</a:t>
-                      </a:r>
-                      <a:r>
-                        <a:rPr lang="en-GB" baseline="30000" dirty="0"/>
-                        <a:t>2</a:t>
-                      </a:r>
-                    </a:p>
-                  </a:txBody>
-                  <a:tcPr/>
-                </a:tc>
-                <a:extLst>
-                  <a:ext uri="{0D108BD9-81ED-4DB2-BD59-A6C34878D82A}">
-                    <a16:rowId xmlns:a16="http://schemas.microsoft.com/office/drawing/2014/main" val="3640030188"/>
-                  </a:ext>
-                </a:extLst>
-              </a:tr>
-              <a:tr h="370840">
-                <a:tc>
-                  <a:txBody>
-                    <a:bodyPr/>
-                    <a:lstStyle/>
-                    <a:p>
-                      <a:r>
-                        <a:rPr lang="en-GB" dirty="0"/>
-                        <a:t>0.559</a:t>
-                      </a:r>
-                    </a:p>
-                  </a:txBody>
-                  <a:tcPr/>
-                </a:tc>
-                <a:tc>
-                  <a:txBody>
-                    <a:bodyPr/>
-                    <a:lstStyle/>
-                    <a:p>
-                      <a:r>
-                        <a:rPr lang="en-GB" dirty="0"/>
-                        <a:t>0.994</a:t>
-                      </a:r>
-                    </a:p>
-                  </a:txBody>
-                  <a:tcPr/>
-                </a:tc>
-                <a:extLst>
-                  <a:ext uri="{0D108BD9-81ED-4DB2-BD59-A6C34878D82A}">
-                    <a16:rowId xmlns:a16="http://schemas.microsoft.com/office/drawing/2014/main" val="1128371097"/>
-                  </a:ext>
-                </a:extLst>
-              </a:tr>
-            </a:tbl>
-          </a:graphicData>
-        </a:graphic>
-      </p:graphicFrame>
     </p:spTree>
     <p:extLst>
       <p:ext uri="{BB962C8B-B14F-4D97-AF65-F5344CB8AC3E}">
-        <p14:creationId xmlns:p14="http://schemas.microsoft.com/office/powerpoint/2010/main" val="234136719"/>
+        <p14:creationId xmlns:p14="http://schemas.microsoft.com/office/powerpoint/2010/main" val="1114119021"/>
       </p:ext>
     </p:extLst>
   </p:cSld>
@@ -7143,24 +8316,6 @@
 </file>
 
 <file path=customXml/item1.xml><?xml version="1.0" encoding="utf-8"?>
-<?mso-contentType ?>
-<FormTemplates xmlns="http://schemas.microsoft.com/sharepoint/v3/contenttype/forms">
-  <Display>DocumentLibraryForm</Display>
-  <Edit>DocumentLibraryForm</Edit>
-  <New>DocumentLibraryForm</New>
-</FormTemplates>
-</file>
-
-<file path=customXml/item2.xml><?xml version="1.0" encoding="utf-8"?>
-<p:properties xmlns:p="http://schemas.microsoft.com/office/2006/metadata/properties" xmlns:xsi="http://www.w3.org/2001/XMLSchema-instance" xmlns:pc="http://schemas.microsoft.com/office/infopath/2007/PartnerControls">
-  <documentManagement>
-    <Status xmlns="71af3243-3dd4-4a8d-8c0d-dd76da1f02a5">Not started</Status>
-    <MediaServiceKeyPoints xmlns="71af3243-3dd4-4a8d-8c0d-dd76da1f02a5" xsi:nil="true"/>
-  </documentManagement>
-</p:properties>
-</file>
-
-<file path=customXml/item3.xml><?xml version="1.0" encoding="utf-8"?>
 <ct:contentTypeSchema xmlns:ct="http://schemas.microsoft.com/office/2006/metadata/contentType" xmlns:ma="http://schemas.microsoft.com/office/2006/metadata/properties/metaAttributes" ct:_="" ma:_="" ma:contentTypeName="Document" ma:contentTypeID="0x01010079F111ED35F8CC479449609E8A0923A6" ma:contentTypeVersion="12" ma:contentTypeDescription="Create a new document." ma:contentTypeScope="" ma:versionID="a410dd7f93c95333ffa1b60ed6adedd1">
   <xsd:schema xmlns:xsd="http://www.w3.org/2001/XMLSchema" xmlns:xs="http://www.w3.org/2001/XMLSchema" xmlns:p="http://schemas.microsoft.com/office/2006/metadata/properties" xmlns:ns2="71af3243-3dd4-4a8d-8c0d-dd76da1f02a5" xmlns:ns3="16c05727-aa75-4e4a-9b5f-8a80a1165891" targetNamespace="http://schemas.microsoft.com/office/2006/metadata/properties" ma:root="true" ma:fieldsID="a936d9baba76aa3866493feff160faab" ns2:_="" ns3:_="">
     <xsd:import namespace="71af3243-3dd4-4a8d-8c0d-dd76da1f02a5"/>
@@ -7381,25 +8536,25 @@
 </ct:contentTypeSchema>
 </file>
 
-<file path=customXml/itemProps1.xml><?xml version="1.0" encoding="utf-8"?>
-<ds:datastoreItem xmlns:ds="http://schemas.openxmlformats.org/officeDocument/2006/customXml" ds:itemID="{AA3F7EDC-E5B4-4BBC-9D2A-CBE6D46C37AD}">
-  <ds:schemaRefs>
-    <ds:schemaRef ds:uri="http://schemas.microsoft.com/sharepoint/v3/contenttype/forms"/>
-  </ds:schemaRefs>
-</ds:datastoreItem>
+<file path=customXml/item2.xml><?xml version="1.0" encoding="utf-8"?>
+<p:properties xmlns:p="http://schemas.microsoft.com/office/2006/metadata/properties" xmlns:xsi="http://www.w3.org/2001/XMLSchema-instance" xmlns:pc="http://schemas.microsoft.com/office/infopath/2007/PartnerControls">
+  <documentManagement>
+    <Status xmlns="71af3243-3dd4-4a8d-8c0d-dd76da1f02a5">Not started</Status>
+    <MediaServiceKeyPoints xmlns="71af3243-3dd4-4a8d-8c0d-dd76da1f02a5" xsi:nil="true"/>
+  </documentManagement>
+</p:properties>
 </file>
 
-<file path=customXml/itemProps2.xml><?xml version="1.0" encoding="utf-8"?>
-<ds:datastoreItem xmlns:ds="http://schemas.openxmlformats.org/officeDocument/2006/customXml" ds:itemID="{A03EEFF0-FB57-4CB4-8BFC-DF397689E2ED}">
-  <ds:schemaRefs>
-    <ds:schemaRef ds:uri="http://schemas.microsoft.com/office/2006/metadata/properties"/>
-    <ds:schemaRef ds:uri="http://schemas.microsoft.com/office/infopath/2007/PartnerControls"/>
-    <ds:schemaRef ds:uri="71af3243-3dd4-4a8d-8c0d-dd76da1f02a5"/>
-  </ds:schemaRefs>
-</ds:datastoreItem>
+<file path=customXml/item3.xml><?xml version="1.0" encoding="utf-8"?>
+<?mso-contentType ?>
+<FormTemplates xmlns="http://schemas.microsoft.com/sharepoint/v3/contenttype/forms">
+  <Display>DocumentLibraryForm</Display>
+  <Edit>DocumentLibraryForm</Edit>
+  <New>DocumentLibraryForm</New>
+</FormTemplates>
 </file>
 
-<file path=customXml/itemProps3.xml><?xml version="1.0" encoding="utf-8"?>
+<file path=customXml/itemProps1.xml><?xml version="1.0" encoding="utf-8"?>
 <ds:datastoreItem xmlns:ds="http://schemas.openxmlformats.org/officeDocument/2006/customXml" ds:itemID="{93932EF5-314F-409E-8020-FEE5FA0795B9}">
   <ds:schemaRefs>
     <ds:schemaRef ds:uri="http://schemas.microsoft.com/office/2006/metadata/contentType"/>
@@ -7416,4 +8571,22 @@
     <ds:schemaRef ds:uri="http://schemas.microsoft.com/internal/obd"/>
   </ds:schemaRefs>
 </ds:datastoreItem>
+</file>
+
+<file path=customXml/itemProps2.xml><?xml version="1.0" encoding="utf-8"?>
+<ds:datastoreItem xmlns:ds="http://schemas.openxmlformats.org/officeDocument/2006/customXml" ds:itemID="{A03EEFF0-FB57-4CB4-8BFC-DF397689E2ED}">
+  <ds:schemaRefs>
+    <ds:schemaRef ds:uri="http://schemas.microsoft.com/office/2006/metadata/properties"/>
+    <ds:schemaRef ds:uri="http://schemas.microsoft.com/office/infopath/2007/PartnerControls"/>
+    <ds:schemaRef ds:uri="71af3243-3dd4-4a8d-8c0d-dd76da1f02a5"/>
+  </ds:schemaRefs>
+</ds:datastoreItem>
+</file>
+
+<file path=customXml/itemProps3.xml><?xml version="1.0" encoding="utf-8"?>
+<ds:datastoreItem xmlns:ds="http://schemas.openxmlformats.org/officeDocument/2006/customXml" ds:itemID="{AA3F7EDC-E5B4-4BBC-9D2A-CBE6D46C37AD}">
+  <ds:schemaRefs>
+    <ds:schemaRef ds:uri="http://schemas.microsoft.com/sharepoint/v3/contenttype/forms"/>
+  </ds:schemaRefs>
+</ds:datastoreItem>
 </file>
</xml_diff>

<commit_message>
created a testpad with basic viz
</commit_message>
<xml_diff>
--- a/deloitte_investment_project/outputs/Deloitte_Investment_Project_JohnHios.pptx
+++ b/deloitte_investment_project/outputs/Deloitte_Investment_Project_JohnHios.pptx
@@ -368,7 +368,7 @@
           <a:p>
             <a:fld id="{9184DA70-C731-4C70-880D-CCD4705E623C}" type="datetime1">
               <a:rPr lang="en-US" smtClean="0"/>
-              <a:t>6/9/2022</a:t>
+              <a:t>6/10/2022</a:t>
             </a:fld>
             <a:endParaRPr lang="en-US" dirty="0"/>
           </a:p>
@@ -556,7 +556,7 @@
           <a:p>
             <a:fld id="{4BE1D723-8F53-4F53-90B0-1982A396982E}" type="datetime1">
               <a:rPr lang="en-US" smtClean="0"/>
-              <a:t>6/9/2022</a:t>
+              <a:t>6/10/2022</a:t>
             </a:fld>
             <a:endParaRPr lang="en-US" dirty="0"/>
           </a:p>
@@ -929,7 +929,7 @@
           <a:p>
             <a:fld id="{97669AF7-7BEB-44E4-9852-375E34362B5B}" type="datetime1">
               <a:rPr lang="en-US" smtClean="0"/>
-              <a:t>6/9/2022</a:t>
+              <a:t>6/10/2022</a:t>
             </a:fld>
             <a:endParaRPr lang="en-US" dirty="0"/>
           </a:p>
@@ -1184,7 +1184,7 @@
           <a:p>
             <a:fld id="{BAAAC38D-0552-4C82-B593-E6124DFADBE2}" type="datetime1">
               <a:rPr lang="en-US" smtClean="0"/>
-              <a:t>6/9/2022</a:t>
+              <a:t>6/10/2022</a:t>
             </a:fld>
             <a:endParaRPr lang="en-US" dirty="0"/>
           </a:p>
@@ -1581,7 +1581,7 @@
           <a:p>
             <a:fld id="{D9DF0F1C-5577-4ACB-BB62-DF8F3C494C7E}" type="datetime1">
               <a:rPr lang="en-US" smtClean="0"/>
-              <a:t>6/9/2022</a:t>
+              <a:t>6/10/2022</a:t>
             </a:fld>
             <a:endParaRPr lang="en-US" dirty="0"/>
           </a:p>
@@ -1717,7 +1717,7 @@
           <a:p>
             <a:fld id="{1775B394-D9F9-4F0C-B15D-605F45CB9E9F}" type="datetime1">
               <a:rPr lang="en-US" smtClean="0"/>
-              <a:t>6/9/2022</a:t>
+              <a:t>6/10/2022</a:t>
             </a:fld>
             <a:endParaRPr lang="en-US" dirty="0"/>
           </a:p>
@@ -1874,7 +1874,7 @@
           <a:p>
             <a:fld id="{39667345-2558-425A-8533-9BFDBCE15005}" type="datetime1">
               <a:rPr lang="en-US" smtClean="0"/>
-              <a:t>6/9/2022</a:t>
+              <a:t>6/10/2022</a:t>
             </a:fld>
             <a:endParaRPr lang="en-US" dirty="0"/>
           </a:p>
@@ -2203,7 +2203,7 @@
           <a:p>
             <a:fld id="{92BEA474-078D-4E9B-9B14-09A87B19DC46}" type="datetime1">
               <a:rPr lang="en-US" smtClean="0"/>
-              <a:t>6/9/2022</a:t>
+              <a:t>6/10/2022</a:t>
             </a:fld>
             <a:endParaRPr lang="en-US" dirty="0"/>
           </a:p>
@@ -2553,7 +2553,7 @@
           <a:p>
             <a:fld id="{4907D986-8816-4272-A432-0437A28A9828}" type="datetime1">
               <a:rPr lang="en-US" smtClean="0"/>
-              <a:t>6/9/2022</a:t>
+              <a:t>6/10/2022</a:t>
             </a:fld>
             <a:endParaRPr lang="en-US" dirty="0"/>
           </a:p>
@@ -2814,7 +2814,7 @@
           <a:p>
             <a:fld id="{62D6E202-B606-4609-B914-27C9371A1F6D}" type="datetime1">
               <a:rPr lang="en-US" smtClean="0"/>
-              <a:t>6/9/2022</a:t>
+              <a:t>6/10/2022</a:t>
             </a:fld>
             <a:endParaRPr lang="en-US" dirty="0"/>
           </a:p>
@@ -3868,7 +3868,7 @@
           <p:nvPr>
             <p:extLst>
               <p:ext uri="{D42A27DB-BD31-4B8C-83A1-F6EECF244321}">
-                <p14:modId xmlns:p14="http://schemas.microsoft.com/office/powerpoint/2010/main" val="3731706070"/>
+                <p14:modId xmlns:p14="http://schemas.microsoft.com/office/powerpoint/2010/main" val="369903519"/>
               </p:ext>
             </p:extLst>
           </p:nvPr>
@@ -3956,7 +3956,7 @@
                     <a:p>
                       <a:r>
                         <a:rPr lang="en-GB" sz="1600" dirty="0"/>
-                        <a:t>32.85</a:t>
+                        <a:t>33.92</a:t>
                       </a:r>
                     </a:p>
                   </a:txBody>
@@ -3986,7 +3986,7 @@
                     <a:p>
                       <a:r>
                         <a:rPr lang="en-GB" sz="1600" dirty="0"/>
-                        <a:t>17.27</a:t>
+                        <a:t>18.23</a:t>
                       </a:r>
                     </a:p>
                   </a:txBody>
@@ -4016,7 +4016,7 @@
                     <a:p>
                       <a:r>
                         <a:rPr lang="en-GB" sz="1600" dirty="0"/>
-                        <a:t>34.42</a:t>
+                        <a:t>35.00</a:t>
                       </a:r>
                     </a:p>
                   </a:txBody>
@@ -4046,7 +4046,7 @@
                     <a:p>
                       <a:r>
                         <a:rPr lang="en-GB" sz="1600" dirty="0"/>
-                        <a:t>15.01</a:t>
+                        <a:t>12.85</a:t>
                       </a:r>
                     </a:p>
                   </a:txBody>
@@ -4077,7 +4077,7 @@
           <p:nvPr>
             <p:extLst>
               <p:ext uri="{D42A27DB-BD31-4B8C-83A1-F6EECF244321}">
-                <p14:modId xmlns:p14="http://schemas.microsoft.com/office/powerpoint/2010/main" val="2330059312"/>
+                <p14:modId xmlns:p14="http://schemas.microsoft.com/office/powerpoint/2010/main" val="2078623503"/>
               </p:ext>
             </p:extLst>
           </p:nvPr>
@@ -4153,7 +4153,7 @@
                     <a:p>
                       <a:r>
                         <a:rPr lang="en-GB" dirty="0"/>
-                        <a:t>0.617</a:t>
+                        <a:t>0.593</a:t>
                       </a:r>
                     </a:p>
                   </a:txBody>
@@ -4166,7 +4166,7 @@
                     <a:p>
                       <a:r>
                         <a:rPr lang="en-GB" dirty="0"/>
-                        <a:t>0.968</a:t>
+                        <a:t>0.945</a:t>
                       </a:r>
                     </a:p>
                   </a:txBody>
@@ -4221,7 +4221,7 @@
                   <a:schemeClr val="bg1"/>
                 </a:solidFill>
               </a:rPr>
-              <a:t>(GDP per hour worked $) = 26.96 </a:t>
+              <a:t>(GDP per hour worked $) = 31.08 </a:t>
             </a:r>
           </a:p>
           <a:p>
@@ -4236,7 +4236,7 @@
                   <a:schemeClr val="bg1"/>
                 </a:solidFill>
               </a:rPr>
-              <a:t>		+ 0.1682</a:t>
+              <a:t>		+ 0.1261</a:t>
             </a:r>
             <a:r>
               <a:rPr lang="en-GB" sz="1400" baseline="-25000" dirty="0">
@@ -4276,7 +4276,7 @@
                   <a:schemeClr val="bg1"/>
                 </a:solidFill>
               </a:rPr>
-              <a:t>		+ 0.1717</a:t>
+              <a:t>		+ 0.0498</a:t>
             </a:r>
             <a:r>
               <a:rPr lang="en-GB" sz="1400" dirty="0">
@@ -4308,7 +4308,7 @@
                   <a:schemeClr val="bg1"/>
                 </a:solidFill>
               </a:rPr>
-              <a:t>		+ 0.2123</a:t>
+              <a:t>		+ 0.2404</a:t>
             </a:r>
             <a:r>
               <a:rPr lang="en-GB" sz="1400" dirty="0">
@@ -4340,7 +4340,7 @@
                   <a:schemeClr val="bg1"/>
                 </a:solidFill>
               </a:rPr>
-              <a:t>		-  0.001436</a:t>
+              <a:t>		-  0.001338</a:t>
             </a:r>
             <a:r>
               <a:rPr lang="en-GB" sz="1400" dirty="0">
@@ -4491,7 +4491,7 @@
             </a:pPr>
             <a:r>
               <a:rPr lang="en-GB" dirty="0"/>
-              <a:t> Infrastructure and Dwelling investments seem to have the largest impact in the UK GDP per hour worked (approx. 33% and 34% respectively)</a:t>
+              <a:t> Infrastructure and Dwelling investments seem to have the largest impact in the UK GDP per hour worked (approx. 34% and 35% respectively)</a:t>
             </a:r>
           </a:p>
           <a:p>
@@ -4501,7 +4501,7 @@
             </a:pPr>
             <a:r>
               <a:rPr lang="en-GB" dirty="0"/>
-              <a:t> Investments in Intellectual property products in the UK is lagging compared to Germany &amp; France and accounts to a small portion of the UK productivity (approx. 17%)</a:t>
+              <a:t> Investments in Intellectual property products in the UK is lagging compared to Germany &amp; France and accounts to a small portion of the UK productivity (approx. 18%)</a:t>
             </a:r>
           </a:p>
           <a:p>
@@ -4728,7 +4728,7 @@
             </a:pPr>
             <a:r>
               <a:rPr lang="en-GB" dirty="0"/>
-              <a:t> Explore alternative clustering methods for grouping data ( for instance, ANN, distribution-based / density-based methods)</a:t>
+              <a:t> Explore alternative clustering methods for grouping data (for instance, ANN, distribution-based / density-based methods)</a:t>
             </a:r>
           </a:p>
           <a:p>
@@ -4738,7 +4738,7 @@
             </a:pPr>
             <a:r>
               <a:rPr lang="en-GB" dirty="0"/>
-              <a:t> Detailed literature survey on predicting productivity using investment data with a view to</a:t>
+              <a:t> Detailed literature survey on predicting productivity using investment data with a view to:</a:t>
             </a:r>
           </a:p>
           <a:p>
@@ -5405,8 +5405,8 @@
         </p:nvSpPr>
         <p:spPr>
           <a:xfrm>
-            <a:off x="1508902" y="4589259"/>
-            <a:ext cx="5629307" cy="2025275"/>
+            <a:off x="1508902" y="4623763"/>
+            <a:ext cx="5629307" cy="1769611"/>
           </a:xfrm>
           <a:prstGeom prst="rect">
             <a:avLst/>
@@ -5414,7 +5414,7 @@
         </p:spPr>
         <p:txBody>
           <a:bodyPr vert="horz" lIns="0" tIns="45720" rIns="0" bIns="45720" rtlCol="0">
-            <a:normAutofit/>
+            <a:normAutofit lnSpcReduction="10000"/>
           </a:bodyPr>
           <a:lstStyle>
             <a:lvl1pPr marL="91440" indent="-91440" algn="l" defTabSz="914400" rtl="0" eaLnBrk="1" latinLnBrk="0" hangingPunct="1">
@@ -6809,8 +6809,8 @@
         </p:nvSpPr>
         <p:spPr>
           <a:xfrm>
-            <a:off x="382765" y="4169126"/>
-            <a:ext cx="5327648" cy="2069747"/>
+            <a:off x="382765" y="4082866"/>
+            <a:ext cx="5327648" cy="2283428"/>
           </a:xfrm>
           <a:prstGeom prst="rect">
             <a:avLst/>
@@ -7062,9 +7062,83 @@
               <a:buChar char="§"/>
             </a:pPr>
             <a:r>
-              <a:rPr lang="en-GB" dirty="0"/>
-              <a:t> 20 European countries are compared in terms of productivity and investment in key assets incl. education</a:t>
-            </a:r>
+              <a:rPr lang="en-GB" sz="1400" dirty="0"/>
+              <a:t> 20 European countries are compared in terms of productivity and investment in education and key assets such as:</a:t>
+            </a:r>
+          </a:p>
+          <a:p>
+            <a:pPr lvl="1">
+              <a:buFont typeface="Wingdings" panose="05000000000000000000" pitchFamily="2" charset="2"/>
+              <a:buChar char="§"/>
+            </a:pPr>
+            <a:r>
+              <a:rPr lang="en-GB" sz="1400" dirty="0"/>
+              <a:t>Intellectual property</a:t>
+            </a:r>
+          </a:p>
+          <a:p>
+            <a:pPr lvl="1">
+              <a:buFont typeface="Wingdings" panose="05000000000000000000" pitchFamily="2" charset="2"/>
+              <a:buChar char="§"/>
+            </a:pPr>
+            <a:r>
+              <a:rPr lang="en-GB" sz="1400" dirty="0"/>
+              <a:t>Dwellings</a:t>
+            </a:r>
+          </a:p>
+          <a:p>
+            <a:pPr lvl="1">
+              <a:buFont typeface="Wingdings" panose="05000000000000000000" pitchFamily="2" charset="2"/>
+              <a:buChar char="§"/>
+            </a:pPr>
+            <a:r>
+              <a:rPr lang="en-GB" sz="1400" dirty="0"/>
+              <a:t>Cultivated biological resources</a:t>
+            </a:r>
+          </a:p>
+          <a:p>
+            <a:pPr lvl="1">
+              <a:buFont typeface="Wingdings" panose="05000000000000000000" pitchFamily="2" charset="2"/>
+              <a:buChar char="§"/>
+            </a:pPr>
+            <a:r>
+              <a:rPr lang="en-GB" sz="1400" dirty="0"/>
+              <a:t>Infrastructures</a:t>
+            </a:r>
+          </a:p>
+          <a:p>
+            <a:pPr lvl="1">
+              <a:buFont typeface="Wingdings" panose="05000000000000000000" pitchFamily="2" charset="2"/>
+              <a:buChar char="§"/>
+            </a:pPr>
+            <a:r>
+              <a:rPr lang="en-GB" sz="1400" dirty="0"/>
+              <a:t>Transportation equipment</a:t>
+            </a:r>
+          </a:p>
+          <a:p>
+            <a:pPr lvl="1">
+              <a:buFont typeface="Wingdings" panose="05000000000000000000" pitchFamily="2" charset="2"/>
+              <a:buChar char="§"/>
+            </a:pPr>
+            <a:r>
+              <a:rPr lang="en-GB" sz="1400" dirty="0"/>
+              <a:t>Information and Communication Tech</a:t>
+            </a:r>
+          </a:p>
+          <a:p>
+            <a:pPr lvl="1">
+              <a:buFont typeface="Wingdings" panose="05000000000000000000" pitchFamily="2" charset="2"/>
+              <a:buChar char="§"/>
+            </a:pPr>
+            <a:endParaRPr lang="en-GB" sz="1400" dirty="0"/>
+          </a:p>
+          <a:p>
+            <a:pPr lvl="1">
+              <a:buFont typeface="Wingdings" panose="05000000000000000000" pitchFamily="2" charset="2"/>
+              <a:buChar char="§"/>
+            </a:pPr>
+            <a:endParaRPr lang="en-GB" sz="1400" dirty="0"/>
           </a:p>
         </p:txBody>
       </p:sp>
@@ -7084,8 +7158,8 @@
         </p:nvSpPr>
         <p:spPr>
           <a:xfrm>
-            <a:off x="5943600" y="4169126"/>
-            <a:ext cx="5967236" cy="2069747"/>
+            <a:off x="6162444" y="4082866"/>
+            <a:ext cx="5422831" cy="2283428"/>
           </a:xfrm>
           <a:prstGeom prst="rect">
             <a:avLst/>
@@ -7337,8 +7411,8 @@
               <a:buChar char="§"/>
             </a:pPr>
             <a:r>
-              <a:rPr lang="en-GB" dirty="0"/>
-              <a:t> The data cluster in 4 groups</a:t>
+              <a:rPr lang="en-GB" sz="1400" dirty="0"/>
+              <a:t> The data cluster in 4 groups:</a:t>
             </a:r>
           </a:p>
           <a:p>
@@ -7347,7 +7421,7 @@
               <a:buChar char="§"/>
             </a:pPr>
             <a:r>
-              <a:rPr lang="en-GB" sz="1600" b="1" dirty="0">
+              <a:rPr lang="en-GB" sz="1400" b="1" dirty="0">
                 <a:solidFill>
                   <a:srgbClr val="33A02C"/>
                 </a:solidFill>
@@ -7355,7 +7429,7 @@
               <a:t>Cluster #1:</a:t>
             </a:r>
             <a:r>
-              <a:rPr lang="en-GB" sz="1600" dirty="0"/>
+              <a:rPr lang="en-GB" sz="1400" dirty="0"/>
               <a:t> Higher productivity economies of smaller EU countries and Scandinavia</a:t>
             </a:r>
           </a:p>
@@ -7365,7 +7439,7 @@
               <a:buChar char="§"/>
             </a:pPr>
             <a:r>
-              <a:rPr lang="en-GB" sz="1600" b="1" dirty="0">
+              <a:rPr lang="en-GB" sz="1400" b="1" dirty="0">
                 <a:solidFill>
                   <a:srgbClr val="D95F02"/>
                 </a:solidFill>
@@ -7373,7 +7447,7 @@
               <a:t>Cluster #2:</a:t>
             </a:r>
             <a:r>
-              <a:rPr lang="en-GB" sz="1600" dirty="0"/>
+              <a:rPr lang="en-GB" sz="1400" dirty="0"/>
               <a:t> Mid-range to low productivity EU economies </a:t>
             </a:r>
           </a:p>
@@ -7383,7 +7457,7 @@
               <a:buChar char="§"/>
             </a:pPr>
             <a:r>
-              <a:rPr lang="en-GB" sz="1600" b="1" dirty="0">
+              <a:rPr lang="en-GB" sz="1400" b="1" dirty="0">
                 <a:solidFill>
                   <a:srgbClr val="7570B3"/>
                 </a:solidFill>
@@ -7391,7 +7465,7 @@
               <a:t>Cluster #3:</a:t>
             </a:r>
             <a:r>
-              <a:rPr lang="en-GB" sz="1600" dirty="0">
+              <a:rPr lang="en-GB" sz="1400" dirty="0">
                 <a:solidFill>
                   <a:srgbClr val="7570B3"/>
                 </a:solidFill>
@@ -7399,7 +7473,7 @@
               <a:t> </a:t>
             </a:r>
             <a:r>
-              <a:rPr lang="en-GB" sz="1600" dirty="0"/>
+              <a:rPr lang="en-GB" sz="1400" dirty="0"/>
               <a:t>Italy, Spain and the UK (mid-range productivity)</a:t>
             </a:r>
           </a:p>
@@ -7409,7 +7483,7 @@
               <a:buChar char="§"/>
             </a:pPr>
             <a:r>
-              <a:rPr lang="en-GB" sz="1600" b="1" dirty="0">
+              <a:rPr lang="en-GB" sz="1400" b="1" dirty="0">
                 <a:solidFill>
                   <a:srgbClr val="E7298A"/>
                 </a:solidFill>
@@ -7417,7 +7491,7 @@
               <a:t>Cluster #4:</a:t>
             </a:r>
             <a:r>
-              <a:rPr lang="en-GB" sz="1600" dirty="0"/>
+              <a:rPr lang="en-GB" sz="1400" dirty="0"/>
               <a:t> France and Germany (advanced productivity)</a:t>
             </a:r>
           </a:p>
@@ -7498,7 +7572,7 @@
         <p:spPr>
           <a:xfrm>
             <a:off x="1097281" y="2108201"/>
-            <a:ext cx="6217920" cy="3760891"/>
+            <a:ext cx="6217920" cy="4085565"/>
           </a:xfrm>
           <a:prstGeom prst="rect">
             <a:avLst/>
@@ -7761,7 +7835,7 @@
             </a:pPr>
             <a:r>
               <a:rPr lang="en-GB" dirty="0"/>
-              <a:t> Factors used to predict productivity</a:t>
+              <a:t> Factors used to predict productivity:</a:t>
             </a:r>
           </a:p>
           <a:p>
@@ -7887,7 +7961,7 @@
             </a:pPr>
             <a:r>
               <a:rPr lang="en-GB" dirty="0"/>
-              <a:t> Education and mental health data were too scarce to use for modelling</a:t>
+              <a:t> Education and mental health not included in model due to data scarcity</a:t>
             </a:r>
           </a:p>
           <a:p>
@@ -8316,6 +8390,24 @@
 </file>
 
 <file path=customXml/item1.xml><?xml version="1.0" encoding="utf-8"?>
+<?mso-contentType ?>
+<FormTemplates xmlns="http://schemas.microsoft.com/sharepoint/v3/contenttype/forms">
+  <Display>DocumentLibraryForm</Display>
+  <Edit>DocumentLibraryForm</Edit>
+  <New>DocumentLibraryForm</New>
+</FormTemplates>
+</file>
+
+<file path=customXml/item2.xml><?xml version="1.0" encoding="utf-8"?>
+<p:properties xmlns:p="http://schemas.microsoft.com/office/2006/metadata/properties" xmlns:xsi="http://www.w3.org/2001/XMLSchema-instance" xmlns:pc="http://schemas.microsoft.com/office/infopath/2007/PartnerControls">
+  <documentManagement>
+    <Status xmlns="71af3243-3dd4-4a8d-8c0d-dd76da1f02a5">Not started</Status>
+    <MediaServiceKeyPoints xmlns="71af3243-3dd4-4a8d-8c0d-dd76da1f02a5" xsi:nil="true"/>
+  </documentManagement>
+</p:properties>
+</file>
+
+<file path=customXml/item3.xml><?xml version="1.0" encoding="utf-8"?>
 <ct:contentTypeSchema xmlns:ct="http://schemas.microsoft.com/office/2006/metadata/contentType" xmlns:ma="http://schemas.microsoft.com/office/2006/metadata/properties/metaAttributes" ct:_="" ma:_="" ma:contentTypeName="Document" ma:contentTypeID="0x01010079F111ED35F8CC479449609E8A0923A6" ma:contentTypeVersion="12" ma:contentTypeDescription="Create a new document." ma:contentTypeScope="" ma:versionID="a410dd7f93c95333ffa1b60ed6adedd1">
   <xsd:schema xmlns:xsd="http://www.w3.org/2001/XMLSchema" xmlns:xs="http://www.w3.org/2001/XMLSchema" xmlns:p="http://schemas.microsoft.com/office/2006/metadata/properties" xmlns:ns2="71af3243-3dd4-4a8d-8c0d-dd76da1f02a5" xmlns:ns3="16c05727-aa75-4e4a-9b5f-8a80a1165891" targetNamespace="http://schemas.microsoft.com/office/2006/metadata/properties" ma:root="true" ma:fieldsID="a936d9baba76aa3866493feff160faab" ns2:_="" ns3:_="">
     <xsd:import namespace="71af3243-3dd4-4a8d-8c0d-dd76da1f02a5"/>
@@ -8536,25 +8628,25 @@
 </ct:contentTypeSchema>
 </file>
 
-<file path=customXml/item2.xml><?xml version="1.0" encoding="utf-8"?>
-<p:properties xmlns:p="http://schemas.microsoft.com/office/2006/metadata/properties" xmlns:xsi="http://www.w3.org/2001/XMLSchema-instance" xmlns:pc="http://schemas.microsoft.com/office/infopath/2007/PartnerControls">
-  <documentManagement>
-    <Status xmlns="71af3243-3dd4-4a8d-8c0d-dd76da1f02a5">Not started</Status>
-    <MediaServiceKeyPoints xmlns="71af3243-3dd4-4a8d-8c0d-dd76da1f02a5" xsi:nil="true"/>
-  </documentManagement>
-</p:properties>
+<file path=customXml/itemProps1.xml><?xml version="1.0" encoding="utf-8"?>
+<ds:datastoreItem xmlns:ds="http://schemas.openxmlformats.org/officeDocument/2006/customXml" ds:itemID="{AA3F7EDC-E5B4-4BBC-9D2A-CBE6D46C37AD}">
+  <ds:schemaRefs>
+    <ds:schemaRef ds:uri="http://schemas.microsoft.com/sharepoint/v3/contenttype/forms"/>
+  </ds:schemaRefs>
+</ds:datastoreItem>
 </file>
 
-<file path=customXml/item3.xml><?xml version="1.0" encoding="utf-8"?>
-<?mso-contentType ?>
-<FormTemplates xmlns="http://schemas.microsoft.com/sharepoint/v3/contenttype/forms">
-  <Display>DocumentLibraryForm</Display>
-  <Edit>DocumentLibraryForm</Edit>
-  <New>DocumentLibraryForm</New>
-</FormTemplates>
+<file path=customXml/itemProps2.xml><?xml version="1.0" encoding="utf-8"?>
+<ds:datastoreItem xmlns:ds="http://schemas.openxmlformats.org/officeDocument/2006/customXml" ds:itemID="{A03EEFF0-FB57-4CB4-8BFC-DF397689E2ED}">
+  <ds:schemaRefs>
+    <ds:schemaRef ds:uri="http://schemas.microsoft.com/office/2006/metadata/properties"/>
+    <ds:schemaRef ds:uri="http://schemas.microsoft.com/office/infopath/2007/PartnerControls"/>
+    <ds:schemaRef ds:uri="71af3243-3dd4-4a8d-8c0d-dd76da1f02a5"/>
+  </ds:schemaRefs>
+</ds:datastoreItem>
 </file>
 
-<file path=customXml/itemProps1.xml><?xml version="1.0" encoding="utf-8"?>
+<file path=customXml/itemProps3.xml><?xml version="1.0" encoding="utf-8"?>
 <ds:datastoreItem xmlns:ds="http://schemas.openxmlformats.org/officeDocument/2006/customXml" ds:itemID="{93932EF5-314F-409E-8020-FEE5FA0795B9}">
   <ds:schemaRefs>
     <ds:schemaRef ds:uri="http://schemas.microsoft.com/office/2006/metadata/contentType"/>
@@ -8571,22 +8663,4 @@
     <ds:schemaRef ds:uri="http://schemas.microsoft.com/internal/obd"/>
   </ds:schemaRefs>
 </ds:datastoreItem>
-</file>
-
-<file path=customXml/itemProps2.xml><?xml version="1.0" encoding="utf-8"?>
-<ds:datastoreItem xmlns:ds="http://schemas.openxmlformats.org/officeDocument/2006/customXml" ds:itemID="{A03EEFF0-FB57-4CB4-8BFC-DF397689E2ED}">
-  <ds:schemaRefs>
-    <ds:schemaRef ds:uri="http://schemas.microsoft.com/office/2006/metadata/properties"/>
-    <ds:schemaRef ds:uri="http://schemas.microsoft.com/office/infopath/2007/PartnerControls"/>
-    <ds:schemaRef ds:uri="71af3243-3dd4-4a8d-8c0d-dd76da1f02a5"/>
-  </ds:schemaRefs>
-</ds:datastoreItem>
-</file>
-
-<file path=customXml/itemProps3.xml><?xml version="1.0" encoding="utf-8"?>
-<ds:datastoreItem xmlns:ds="http://schemas.openxmlformats.org/officeDocument/2006/customXml" ds:itemID="{AA3F7EDC-E5B4-4BBC-9D2A-CBE6D46C37AD}">
-  <ds:schemaRefs>
-    <ds:schemaRef ds:uri="http://schemas.microsoft.com/sharepoint/v3/contenttype/forms"/>
-  </ds:schemaRefs>
-</ds:datastoreItem>
 </file>
</xml_diff>

<commit_message>
amended R scripts - renamed location and time to country and year
</commit_message>
<xml_diff>
--- a/deloitte_investment_project/outputs/Deloitte_Investment_Project_JohnHios.pptx
+++ b/deloitte_investment_project/outputs/Deloitte_Investment_Project_JohnHios.pptx
@@ -368,7 +368,7 @@
           <a:p>
             <a:fld id="{9184DA70-C731-4C70-880D-CCD4705E623C}" type="datetime1">
               <a:rPr lang="en-US" smtClean="0"/>
-              <a:t>6/10/2022</a:t>
+              <a:t>6/14/2022</a:t>
             </a:fld>
             <a:endParaRPr lang="en-US" dirty="0"/>
           </a:p>
@@ -556,7 +556,7 @@
           <a:p>
             <a:fld id="{4BE1D723-8F53-4F53-90B0-1982A396982E}" type="datetime1">
               <a:rPr lang="en-US" smtClean="0"/>
-              <a:t>6/10/2022</a:t>
+              <a:t>6/14/2022</a:t>
             </a:fld>
             <a:endParaRPr lang="en-US" dirty="0"/>
           </a:p>
@@ -929,7 +929,7 @@
           <a:p>
             <a:fld id="{97669AF7-7BEB-44E4-9852-375E34362B5B}" type="datetime1">
               <a:rPr lang="en-US" smtClean="0"/>
-              <a:t>6/10/2022</a:t>
+              <a:t>6/14/2022</a:t>
             </a:fld>
             <a:endParaRPr lang="en-US" dirty="0"/>
           </a:p>
@@ -1184,7 +1184,7 @@
           <a:p>
             <a:fld id="{BAAAC38D-0552-4C82-B593-E6124DFADBE2}" type="datetime1">
               <a:rPr lang="en-US" smtClean="0"/>
-              <a:t>6/10/2022</a:t>
+              <a:t>6/14/2022</a:t>
             </a:fld>
             <a:endParaRPr lang="en-US" dirty="0"/>
           </a:p>
@@ -1581,7 +1581,7 @@
           <a:p>
             <a:fld id="{D9DF0F1C-5577-4ACB-BB62-DF8F3C494C7E}" type="datetime1">
               <a:rPr lang="en-US" smtClean="0"/>
-              <a:t>6/10/2022</a:t>
+              <a:t>6/14/2022</a:t>
             </a:fld>
             <a:endParaRPr lang="en-US" dirty="0"/>
           </a:p>
@@ -1717,7 +1717,7 @@
           <a:p>
             <a:fld id="{1775B394-D9F9-4F0C-B15D-605F45CB9E9F}" type="datetime1">
               <a:rPr lang="en-US" smtClean="0"/>
-              <a:t>6/10/2022</a:t>
+              <a:t>6/14/2022</a:t>
             </a:fld>
             <a:endParaRPr lang="en-US" dirty="0"/>
           </a:p>
@@ -1874,7 +1874,7 @@
           <a:p>
             <a:fld id="{39667345-2558-425A-8533-9BFDBCE15005}" type="datetime1">
               <a:rPr lang="en-US" smtClean="0"/>
-              <a:t>6/10/2022</a:t>
+              <a:t>6/14/2022</a:t>
             </a:fld>
             <a:endParaRPr lang="en-US" dirty="0"/>
           </a:p>
@@ -2203,7 +2203,7 @@
           <a:p>
             <a:fld id="{92BEA474-078D-4E9B-9B14-09A87B19DC46}" type="datetime1">
               <a:rPr lang="en-US" smtClean="0"/>
-              <a:t>6/10/2022</a:t>
+              <a:t>6/14/2022</a:t>
             </a:fld>
             <a:endParaRPr lang="en-US" dirty="0"/>
           </a:p>
@@ -2553,7 +2553,7 @@
           <a:p>
             <a:fld id="{4907D986-8816-4272-A432-0437A28A9828}" type="datetime1">
               <a:rPr lang="en-US" smtClean="0"/>
-              <a:t>6/10/2022</a:t>
+              <a:t>6/14/2022</a:t>
             </a:fld>
             <a:endParaRPr lang="en-US" dirty="0"/>
           </a:p>
@@ -2814,7 +2814,7 @@
           <a:p>
             <a:fld id="{62D6E202-B606-4609-B914-27C9371A1F6D}" type="datetime1">
               <a:rPr lang="en-US" smtClean="0"/>
-              <a:t>6/10/2022</a:t>
+              <a:t>6/14/2022</a:t>
             </a:fld>
             <a:endParaRPr lang="en-US" dirty="0"/>
           </a:p>
@@ -8390,24 +8390,6 @@
 </file>
 
 <file path=customXml/item1.xml><?xml version="1.0" encoding="utf-8"?>
-<?mso-contentType ?>
-<FormTemplates xmlns="http://schemas.microsoft.com/sharepoint/v3/contenttype/forms">
-  <Display>DocumentLibraryForm</Display>
-  <Edit>DocumentLibraryForm</Edit>
-  <New>DocumentLibraryForm</New>
-</FormTemplates>
-</file>
-
-<file path=customXml/item2.xml><?xml version="1.0" encoding="utf-8"?>
-<p:properties xmlns:p="http://schemas.microsoft.com/office/2006/metadata/properties" xmlns:xsi="http://www.w3.org/2001/XMLSchema-instance" xmlns:pc="http://schemas.microsoft.com/office/infopath/2007/PartnerControls">
-  <documentManagement>
-    <Status xmlns="71af3243-3dd4-4a8d-8c0d-dd76da1f02a5">Not started</Status>
-    <MediaServiceKeyPoints xmlns="71af3243-3dd4-4a8d-8c0d-dd76da1f02a5" xsi:nil="true"/>
-  </documentManagement>
-</p:properties>
-</file>
-
-<file path=customXml/item3.xml><?xml version="1.0" encoding="utf-8"?>
 <ct:contentTypeSchema xmlns:ct="http://schemas.microsoft.com/office/2006/metadata/contentType" xmlns:ma="http://schemas.microsoft.com/office/2006/metadata/properties/metaAttributes" ct:_="" ma:_="" ma:contentTypeName="Document" ma:contentTypeID="0x01010079F111ED35F8CC479449609E8A0923A6" ma:contentTypeVersion="12" ma:contentTypeDescription="Create a new document." ma:contentTypeScope="" ma:versionID="a410dd7f93c95333ffa1b60ed6adedd1">
   <xsd:schema xmlns:xsd="http://www.w3.org/2001/XMLSchema" xmlns:xs="http://www.w3.org/2001/XMLSchema" xmlns:p="http://schemas.microsoft.com/office/2006/metadata/properties" xmlns:ns2="71af3243-3dd4-4a8d-8c0d-dd76da1f02a5" xmlns:ns3="16c05727-aa75-4e4a-9b5f-8a80a1165891" targetNamespace="http://schemas.microsoft.com/office/2006/metadata/properties" ma:root="true" ma:fieldsID="a936d9baba76aa3866493feff160faab" ns2:_="" ns3:_="">
     <xsd:import namespace="71af3243-3dd4-4a8d-8c0d-dd76da1f02a5"/>
@@ -8628,25 +8610,25 @@
 </ct:contentTypeSchema>
 </file>
 
-<file path=customXml/itemProps1.xml><?xml version="1.0" encoding="utf-8"?>
-<ds:datastoreItem xmlns:ds="http://schemas.openxmlformats.org/officeDocument/2006/customXml" ds:itemID="{AA3F7EDC-E5B4-4BBC-9D2A-CBE6D46C37AD}">
-  <ds:schemaRefs>
-    <ds:schemaRef ds:uri="http://schemas.microsoft.com/sharepoint/v3/contenttype/forms"/>
-  </ds:schemaRefs>
-</ds:datastoreItem>
+<file path=customXml/item2.xml><?xml version="1.0" encoding="utf-8"?>
+<p:properties xmlns:p="http://schemas.microsoft.com/office/2006/metadata/properties" xmlns:xsi="http://www.w3.org/2001/XMLSchema-instance" xmlns:pc="http://schemas.microsoft.com/office/infopath/2007/PartnerControls">
+  <documentManagement>
+    <Status xmlns="71af3243-3dd4-4a8d-8c0d-dd76da1f02a5">Not started</Status>
+    <MediaServiceKeyPoints xmlns="71af3243-3dd4-4a8d-8c0d-dd76da1f02a5" xsi:nil="true"/>
+  </documentManagement>
+</p:properties>
 </file>
 
-<file path=customXml/itemProps2.xml><?xml version="1.0" encoding="utf-8"?>
-<ds:datastoreItem xmlns:ds="http://schemas.openxmlformats.org/officeDocument/2006/customXml" ds:itemID="{A03EEFF0-FB57-4CB4-8BFC-DF397689E2ED}">
-  <ds:schemaRefs>
-    <ds:schemaRef ds:uri="http://schemas.microsoft.com/office/2006/metadata/properties"/>
-    <ds:schemaRef ds:uri="http://schemas.microsoft.com/office/infopath/2007/PartnerControls"/>
-    <ds:schemaRef ds:uri="71af3243-3dd4-4a8d-8c0d-dd76da1f02a5"/>
-  </ds:schemaRefs>
-</ds:datastoreItem>
+<file path=customXml/item3.xml><?xml version="1.0" encoding="utf-8"?>
+<?mso-contentType ?>
+<FormTemplates xmlns="http://schemas.microsoft.com/sharepoint/v3/contenttype/forms">
+  <Display>DocumentLibraryForm</Display>
+  <Edit>DocumentLibraryForm</Edit>
+  <New>DocumentLibraryForm</New>
+</FormTemplates>
 </file>
 
-<file path=customXml/itemProps3.xml><?xml version="1.0" encoding="utf-8"?>
+<file path=customXml/itemProps1.xml><?xml version="1.0" encoding="utf-8"?>
 <ds:datastoreItem xmlns:ds="http://schemas.openxmlformats.org/officeDocument/2006/customXml" ds:itemID="{93932EF5-314F-409E-8020-FEE5FA0795B9}">
   <ds:schemaRefs>
     <ds:schemaRef ds:uri="http://schemas.microsoft.com/office/2006/metadata/contentType"/>
@@ -8663,4 +8645,22 @@
     <ds:schemaRef ds:uri="http://schemas.microsoft.com/internal/obd"/>
   </ds:schemaRefs>
 </ds:datastoreItem>
+</file>
+
+<file path=customXml/itemProps2.xml><?xml version="1.0" encoding="utf-8"?>
+<ds:datastoreItem xmlns:ds="http://schemas.openxmlformats.org/officeDocument/2006/customXml" ds:itemID="{A03EEFF0-FB57-4CB4-8BFC-DF397689E2ED}">
+  <ds:schemaRefs>
+    <ds:schemaRef ds:uri="http://schemas.microsoft.com/office/2006/metadata/properties"/>
+    <ds:schemaRef ds:uri="http://schemas.microsoft.com/office/infopath/2007/PartnerControls"/>
+    <ds:schemaRef ds:uri="71af3243-3dd4-4a8d-8c0d-dd76da1f02a5"/>
+  </ds:schemaRefs>
+</ds:datastoreItem>
+</file>
+
+<file path=customXml/itemProps3.xml><?xml version="1.0" encoding="utf-8"?>
+<ds:datastoreItem xmlns:ds="http://schemas.openxmlformats.org/officeDocument/2006/customXml" ds:itemID="{AA3F7EDC-E5B4-4BBC-9D2A-CBE6D46C37AD}">
+  <ds:schemaRefs>
+    <ds:schemaRef ds:uri="http://schemas.microsoft.com/sharepoint/v3/contenttype/forms"/>
+  </ds:schemaRefs>
+</ds:datastoreItem>
 </file>
</xml_diff>